<commit_message>
Updated ER Diagram Updated a bit of the UI and the routes for registration of users and user homepages
</commit_message>
<xml_diff>
--- a/ER+Diagram(diagram in last slide).pptx
+++ b/ER+Diagram(diagram in last slide).pptx
@@ -269,7 +269,7 @@
           <a:p>
             <a:fld id="{CF2A1630-D6BA-43E0-8E45-4E094A6624F7}" type="datetimeFigureOut">
               <a:rPr lang="en-GB" smtClean="0"/>
-              <a:t>05/11/2020</a:t>
+              <a:t>06/11/2020</a:t>
             </a:fld>
             <a:endParaRPr lang="en-GB"/>
           </a:p>
@@ -469,7 +469,7 @@
           <a:p>
             <a:fld id="{CF2A1630-D6BA-43E0-8E45-4E094A6624F7}" type="datetimeFigureOut">
               <a:rPr lang="en-GB" smtClean="0"/>
-              <a:t>05/11/2020</a:t>
+              <a:t>06/11/2020</a:t>
             </a:fld>
             <a:endParaRPr lang="en-GB"/>
           </a:p>
@@ -679,7 +679,7 @@
           <a:p>
             <a:fld id="{CF2A1630-D6BA-43E0-8E45-4E094A6624F7}" type="datetimeFigureOut">
               <a:rPr lang="en-GB" smtClean="0"/>
-              <a:t>05/11/2020</a:t>
+              <a:t>06/11/2020</a:t>
             </a:fld>
             <a:endParaRPr lang="en-GB"/>
           </a:p>
@@ -879,7 +879,7 @@
           <a:p>
             <a:fld id="{CF2A1630-D6BA-43E0-8E45-4E094A6624F7}" type="datetimeFigureOut">
               <a:rPr lang="en-GB" smtClean="0"/>
-              <a:t>05/11/2020</a:t>
+              <a:t>06/11/2020</a:t>
             </a:fld>
             <a:endParaRPr lang="en-GB"/>
           </a:p>
@@ -1155,7 +1155,7 @@
           <a:p>
             <a:fld id="{CF2A1630-D6BA-43E0-8E45-4E094A6624F7}" type="datetimeFigureOut">
               <a:rPr lang="en-GB" smtClean="0"/>
-              <a:t>05/11/2020</a:t>
+              <a:t>06/11/2020</a:t>
             </a:fld>
             <a:endParaRPr lang="en-GB"/>
           </a:p>
@@ -1423,7 +1423,7 @@
           <a:p>
             <a:fld id="{CF2A1630-D6BA-43E0-8E45-4E094A6624F7}" type="datetimeFigureOut">
               <a:rPr lang="en-GB" smtClean="0"/>
-              <a:t>05/11/2020</a:t>
+              <a:t>06/11/2020</a:t>
             </a:fld>
             <a:endParaRPr lang="en-GB"/>
           </a:p>
@@ -1838,7 +1838,7 @@
           <a:p>
             <a:fld id="{CF2A1630-D6BA-43E0-8E45-4E094A6624F7}" type="datetimeFigureOut">
               <a:rPr lang="en-GB" smtClean="0"/>
-              <a:t>05/11/2020</a:t>
+              <a:t>06/11/2020</a:t>
             </a:fld>
             <a:endParaRPr lang="en-GB"/>
           </a:p>
@@ -1980,7 +1980,7 @@
           <a:p>
             <a:fld id="{CF2A1630-D6BA-43E0-8E45-4E094A6624F7}" type="datetimeFigureOut">
               <a:rPr lang="en-GB" smtClean="0"/>
-              <a:t>05/11/2020</a:t>
+              <a:t>06/11/2020</a:t>
             </a:fld>
             <a:endParaRPr lang="en-GB"/>
           </a:p>
@@ -2093,7 +2093,7 @@
           <a:p>
             <a:fld id="{CF2A1630-D6BA-43E0-8E45-4E094A6624F7}" type="datetimeFigureOut">
               <a:rPr lang="en-GB" smtClean="0"/>
-              <a:t>05/11/2020</a:t>
+              <a:t>06/11/2020</a:t>
             </a:fld>
             <a:endParaRPr lang="en-GB"/>
           </a:p>
@@ -2406,7 +2406,7 @@
           <a:p>
             <a:fld id="{CF2A1630-D6BA-43E0-8E45-4E094A6624F7}" type="datetimeFigureOut">
               <a:rPr lang="en-GB" smtClean="0"/>
-              <a:t>05/11/2020</a:t>
+              <a:t>06/11/2020</a:t>
             </a:fld>
             <a:endParaRPr lang="en-GB"/>
           </a:p>
@@ -2695,7 +2695,7 @@
           <a:p>
             <a:fld id="{CF2A1630-D6BA-43E0-8E45-4E094A6624F7}" type="datetimeFigureOut">
               <a:rPr lang="en-GB" smtClean="0"/>
-              <a:t>05/11/2020</a:t>
+              <a:t>06/11/2020</a:t>
             </a:fld>
             <a:endParaRPr lang="en-GB"/>
           </a:p>
@@ -2938,7 +2938,7 @@
           <a:p>
             <a:fld id="{CF2A1630-D6BA-43E0-8E45-4E094A6624F7}" type="datetimeFigureOut">
               <a:rPr lang="en-GB" smtClean="0"/>
-              <a:t>05/11/2020</a:t>
+              <a:t>06/11/2020</a:t>
             </a:fld>
             <a:endParaRPr lang="en-GB"/>
           </a:p>
@@ -12837,47 +12837,6 @@
           </a:fontRef>
         </p:style>
       </p:cxnSp>
-      <p:cxnSp>
-        <p:nvCxnSpPr>
-          <p:cNvPr id="27" name="Straight Connector 26">
-            <a:extLst>
-              <a:ext uri="{FF2B5EF4-FFF2-40B4-BE49-F238E27FC236}">
-                <a16:creationId xmlns:a16="http://schemas.microsoft.com/office/drawing/2014/main" id="{C5CA2A16-FE25-4DA2-BED3-419820EBCFCA}"/>
-              </a:ext>
-            </a:extLst>
-          </p:cNvPr>
-          <p:cNvCxnSpPr>
-            <a:cxnSpLocks/>
-            <a:stCxn id="28" idx="0"/>
-            <a:endCxn id="20" idx="2"/>
-          </p:cNvCxnSpPr>
-          <p:nvPr/>
-        </p:nvCxnSpPr>
-        <p:spPr>
-          <a:xfrm flipH="1" flipV="1">
-            <a:off x="7183658" y="4120557"/>
-            <a:ext cx="725253" cy="828621"/>
-          </a:xfrm>
-          <a:prstGeom prst="line">
-            <a:avLst/>
-          </a:prstGeom>
-          <a:ln w="15875"/>
-        </p:spPr>
-        <p:style>
-          <a:lnRef idx="2">
-            <a:schemeClr val="dk1"/>
-          </a:lnRef>
-          <a:fillRef idx="0">
-            <a:schemeClr val="dk1"/>
-          </a:fillRef>
-          <a:effectRef idx="1">
-            <a:schemeClr val="dk1"/>
-          </a:effectRef>
-          <a:fontRef idx="minor">
-            <a:schemeClr val="tx1"/>
-          </a:fontRef>
-        </p:style>
-      </p:cxnSp>
       <p:sp>
         <p:nvSpPr>
           <p:cNvPr id="28" name="Diamond 27">
@@ -13160,7 +13119,7 @@
         </p:nvSpPr>
         <p:spPr>
           <a:xfrm>
-            <a:off x="6648702" y="2416120"/>
+            <a:off x="6182353" y="4435374"/>
             <a:ext cx="1104924" cy="540000"/>
           </a:xfrm>
           <a:prstGeom prst="ellipse">
@@ -13205,15 +13164,15 @@
           </p:cNvPr>
           <p:cNvCxnSpPr>
             <a:cxnSpLocks/>
-            <a:stCxn id="20" idx="0"/>
-            <a:endCxn id="182" idx="4"/>
+            <a:stCxn id="20" idx="2"/>
+            <a:endCxn id="182" idx="0"/>
           </p:cNvCxnSpPr>
           <p:nvPr/>
         </p:nvCxnSpPr>
         <p:spPr>
-          <a:xfrm flipV="1">
-            <a:off x="7183658" y="2956120"/>
-            <a:ext cx="17506" cy="566760"/>
+          <a:xfrm flipH="1">
+            <a:off x="6734815" y="4120557"/>
+            <a:ext cx="448843" cy="314817"/>
           </a:xfrm>
           <a:prstGeom prst="line">
             <a:avLst/>
@@ -13249,7 +13208,7 @@
         </p:nvSpPr>
         <p:spPr>
           <a:xfrm>
-            <a:off x="4278616" y="-369603"/>
+            <a:off x="4185684" y="-338721"/>
             <a:ext cx="1197027" cy="540000"/>
           </a:xfrm>
           <a:prstGeom prst="ellipse">
@@ -13301,8 +13260,8 @@
         </p:nvCxnSpPr>
         <p:spPr>
           <a:xfrm flipH="1" flipV="1">
-            <a:off x="4877130" y="170397"/>
-            <a:ext cx="209231" cy="1235910"/>
+            <a:off x="4784198" y="201279"/>
+            <a:ext cx="302163" cy="1205028"/>
           </a:xfrm>
           <a:prstGeom prst="line">
             <a:avLst/>
@@ -13431,7 +13390,7 @@
         </p:nvSpPr>
         <p:spPr>
           <a:xfrm>
-            <a:off x="2489151" y="944099"/>
+            <a:off x="2249651" y="796226"/>
             <a:ext cx="1406173" cy="540000"/>
           </a:xfrm>
           <a:prstGeom prst="ellipse">
@@ -13483,8 +13442,8 @@
         </p:nvCxnSpPr>
         <p:spPr>
           <a:xfrm flipH="1" flipV="1">
-            <a:off x="3895324" y="1214099"/>
-            <a:ext cx="1191037" cy="192208"/>
+            <a:off x="3655824" y="1066226"/>
+            <a:ext cx="1430537" cy="340081"/>
           </a:xfrm>
           <a:prstGeom prst="line">
             <a:avLst/>
@@ -13520,7 +13479,7 @@
         </p:nvSpPr>
         <p:spPr>
           <a:xfrm>
-            <a:off x="6203678" y="624869"/>
+            <a:off x="1890637" y="2190287"/>
             <a:ext cx="1197027" cy="540000"/>
           </a:xfrm>
           <a:prstGeom prst="ellipse">
@@ -13565,15 +13524,15 @@
           </p:cNvPr>
           <p:cNvCxnSpPr>
             <a:cxnSpLocks/>
-            <a:stCxn id="5" idx="0"/>
-            <a:endCxn id="48" idx="2"/>
+            <a:stCxn id="5" idx="1"/>
+            <a:endCxn id="48" idx="6"/>
           </p:cNvCxnSpPr>
           <p:nvPr/>
         </p:nvCxnSpPr>
         <p:spPr>
-          <a:xfrm flipV="1">
-            <a:off x="5086361" y="894869"/>
-            <a:ext cx="1117317" cy="511438"/>
+          <a:xfrm flipH="1">
+            <a:off x="3087664" y="1721155"/>
+            <a:ext cx="1468697" cy="739132"/>
           </a:xfrm>
           <a:prstGeom prst="line">
             <a:avLst/>
@@ -13834,7 +13793,7 @@
         </p:nvSpPr>
         <p:spPr>
           <a:xfrm>
-            <a:off x="5583832" y="-151839"/>
+            <a:off x="1664072" y="1475338"/>
             <a:ext cx="1197027" cy="540000"/>
           </a:xfrm>
           <a:prstGeom prst="ellipse">
@@ -13879,14 +13838,15 @@
           </p:cNvPr>
           <p:cNvCxnSpPr>
             <a:cxnSpLocks/>
-            <a:stCxn id="5" idx="0"/>
+            <a:stCxn id="5" idx="1"/>
+            <a:endCxn id="7" idx="6"/>
           </p:cNvCxnSpPr>
           <p:nvPr/>
         </p:nvCxnSpPr>
         <p:spPr>
-          <a:xfrm flipV="1">
-            <a:off x="5086361" y="348989"/>
-            <a:ext cx="778565" cy="1057318"/>
+          <a:xfrm flipH="1">
+            <a:off x="2861099" y="1721155"/>
+            <a:ext cx="1695262" cy="24183"/>
           </a:xfrm>
           <a:prstGeom prst="line">
             <a:avLst/>
@@ -15926,7 +15886,7 @@
         </p:nvSpPr>
         <p:spPr>
           <a:xfrm>
-            <a:off x="8755369" y="3370926"/>
+            <a:off x="9615193" y="4045312"/>
             <a:ext cx="1620000" cy="540000"/>
           </a:xfrm>
           <a:prstGeom prst="triangle">
@@ -15983,7 +15943,7 @@
         <p:spPr>
           <a:xfrm>
             <a:off x="7918092" y="3821719"/>
-            <a:ext cx="837277" cy="89207"/>
+            <a:ext cx="1697101" cy="763593"/>
           </a:xfrm>
           <a:prstGeom prst="line">
             <a:avLst/>
@@ -16019,7 +15979,7 @@
         </p:nvSpPr>
         <p:spPr>
           <a:xfrm>
-            <a:off x="10943818" y="2101479"/>
+            <a:off x="12785698" y="3669208"/>
             <a:ext cx="1322071" cy="645605"/>
           </a:xfrm>
           <a:prstGeom prst="rect">
@@ -16068,7 +16028,7 @@
         </p:nvSpPr>
         <p:spPr>
           <a:xfrm>
-            <a:off x="10943818" y="3597823"/>
+            <a:off x="12785699" y="4836372"/>
             <a:ext cx="1322071" cy="645605"/>
           </a:xfrm>
           <a:prstGeom prst="rect">
@@ -16121,8 +16081,8 @@
         </p:nvCxnSpPr>
         <p:spPr>
           <a:xfrm>
-            <a:off x="10375369" y="3910926"/>
-            <a:ext cx="568449" cy="9700"/>
+            <a:off x="11235193" y="4585312"/>
+            <a:ext cx="1550506" cy="573863"/>
           </a:xfrm>
           <a:prstGeom prst="line">
             <a:avLst/>
@@ -16158,7 +16118,7 @@
         </p:nvSpPr>
         <p:spPr>
           <a:xfrm>
-            <a:off x="12803620" y="3484373"/>
+            <a:off x="14983705" y="4714701"/>
             <a:ext cx="3066977" cy="872503"/>
           </a:xfrm>
           <a:prstGeom prst="diamond">
@@ -16211,8 +16171,8 @@
         </p:nvCxnSpPr>
         <p:spPr>
           <a:xfrm flipV="1">
-            <a:off x="12265889" y="3920625"/>
-            <a:ext cx="537731" cy="1"/>
+            <a:off x="14107770" y="5150953"/>
+            <a:ext cx="875935" cy="8222"/>
           </a:xfrm>
           <a:prstGeom prst="line">
             <a:avLst/>
@@ -16248,7 +16208,7 @@
         </p:nvSpPr>
         <p:spPr>
           <a:xfrm>
-            <a:off x="13784646" y="4591931"/>
+            <a:off x="15964731" y="5822259"/>
             <a:ext cx="1104924" cy="540000"/>
           </a:xfrm>
           <a:prstGeom prst="ellipse">
@@ -16300,7 +16260,7 @@
         </p:nvCxnSpPr>
         <p:spPr>
           <a:xfrm flipH="1">
-            <a:off x="14337108" y="4356876"/>
+            <a:off x="16517193" y="5587204"/>
             <a:ext cx="1" cy="235055"/>
           </a:xfrm>
           <a:prstGeom prst="line">
@@ -16323,8 +16283,8 @@
           </a:fontRef>
         </p:style>
       </p:cxnSp>
-      <mc:AlternateContent xmlns:mc="http://schemas.openxmlformats.org/markup-compatibility/2006" xmlns:a14="http://schemas.microsoft.com/office/drawing/2010/main">
-        <mc:Choice Requires="a14">
+      <mc:AlternateContent xmlns:mc="http://schemas.openxmlformats.org/markup-compatibility/2006">
+        <mc:Choice xmlns:a14="http://schemas.microsoft.com/office/drawing/2010/main" Requires="a14">
           <p:sp>
             <p:nvSpPr>
               <p:cNvPr id="410" name="Rectangle 409">
@@ -16339,7 +16299,7 @@
             </p:nvSpPr>
             <p:spPr>
               <a:xfrm>
-                <a:off x="13602673" y="915260"/>
+                <a:off x="15827052" y="2504150"/>
                 <a:ext cx="1468869" cy="597677"/>
               </a:xfrm>
               <a:prstGeom prst="rect">
@@ -16388,7 +16348,7 @@
             </p:txBody>
           </p:sp>
         </mc:Choice>
-        <mc:Fallback xmlns="">
+        <mc:Fallback>
           <p:sp>
             <p:nvSpPr>
               <p:cNvPr id="410" name="Rectangle 409">
@@ -16405,7 +16365,7 @@
             </p:nvSpPr>
             <p:spPr>
               <a:xfrm>
-                <a:off x="13602673" y="915260"/>
+                <a:off x="15827052" y="2504150"/>
                 <a:ext cx="1468869" cy="597677"/>
               </a:xfrm>
               <a:prstGeom prst="rect">
@@ -16447,7 +16407,7 @@
         </p:nvSpPr>
         <p:spPr>
           <a:xfrm>
-            <a:off x="13661634" y="-168850"/>
+            <a:off x="15886013" y="1420040"/>
             <a:ext cx="1322071" cy="566760"/>
           </a:xfrm>
           <a:prstGeom prst="ellipse">
@@ -16499,7 +16459,7 @@
         </p:nvCxnSpPr>
         <p:spPr>
           <a:xfrm flipH="1" flipV="1">
-            <a:off x="14322670" y="397910"/>
+            <a:off x="16547049" y="1986800"/>
             <a:ext cx="14438" cy="517350"/>
           </a:xfrm>
           <a:prstGeom prst="line">
@@ -16539,9 +16499,9 @@
           <p:nvPr/>
         </p:nvCxnSpPr>
         <p:spPr>
-          <a:xfrm flipH="1" flipV="1">
-            <a:off x="14337108" y="1512937"/>
-            <a:ext cx="1" cy="1971436"/>
+          <a:xfrm flipV="1">
+            <a:off x="16517194" y="3101827"/>
+            <a:ext cx="44293" cy="1612874"/>
           </a:xfrm>
           <a:prstGeom prst="line">
             <a:avLst/>
@@ -16581,8 +16541,8 @@
         </p:nvCxnSpPr>
         <p:spPr>
           <a:xfrm flipH="1">
-            <a:off x="10375369" y="2424282"/>
-            <a:ext cx="568449" cy="1486644"/>
+            <a:off x="11235193" y="3992011"/>
+            <a:ext cx="1550505" cy="593301"/>
           </a:xfrm>
           <a:prstGeom prst="line">
             <a:avLst/>
@@ -16618,7 +16578,7 @@
         </p:nvSpPr>
         <p:spPr>
           <a:xfrm>
-            <a:off x="10154696" y="787198"/>
+            <a:off x="11996575" y="2347291"/>
             <a:ext cx="2900316" cy="872503"/>
           </a:xfrm>
           <a:prstGeom prst="diamond">
@@ -16667,7 +16627,7 @@
         </p:nvSpPr>
         <p:spPr>
           <a:xfrm>
-            <a:off x="8733810" y="951151"/>
+            <a:off x="10850234" y="3224352"/>
             <a:ext cx="1104924" cy="540000"/>
           </a:xfrm>
           <a:prstGeom prst="ellipse">
@@ -16713,14 +16673,14 @@
           <p:cNvCxnSpPr>
             <a:cxnSpLocks/>
             <a:stCxn id="429" idx="1"/>
-            <a:endCxn id="430" idx="6"/>
+            <a:endCxn id="430" idx="7"/>
           </p:cNvCxnSpPr>
           <p:nvPr/>
         </p:nvCxnSpPr>
         <p:spPr>
-          <a:xfrm flipH="1" flipV="1">
-            <a:off x="9838734" y="1221151"/>
-            <a:ext cx="315962" cy="2299"/>
+          <a:xfrm flipH="1">
+            <a:off x="11793346" y="2783543"/>
+            <a:ext cx="203229" cy="519890"/>
           </a:xfrm>
           <a:prstGeom prst="line">
             <a:avLst/>
@@ -16759,9 +16719,9 @@
           <p:nvPr/>
         </p:nvCxnSpPr>
         <p:spPr>
-          <a:xfrm flipV="1">
-            <a:off x="13055012" y="1214099"/>
-            <a:ext cx="547661" cy="9351"/>
+          <a:xfrm>
+            <a:off x="14896891" y="2783543"/>
+            <a:ext cx="930161" cy="19446"/>
           </a:xfrm>
           <a:prstGeom prst="line">
             <a:avLst/>
@@ -16800,9 +16760,291 @@
           <p:nvPr/>
         </p:nvCxnSpPr>
         <p:spPr>
+          <a:xfrm flipH="1" flipV="1">
+            <a:off x="13446733" y="3219794"/>
+            <a:ext cx="1" cy="449414"/>
+          </a:xfrm>
+          <a:prstGeom prst="line">
+            <a:avLst/>
+          </a:prstGeom>
+          <a:ln w="15875"/>
+        </p:spPr>
+        <p:style>
+          <a:lnRef idx="2">
+            <a:schemeClr val="dk1"/>
+          </a:lnRef>
+          <a:fillRef idx="0">
+            <a:schemeClr val="dk1"/>
+          </a:fillRef>
+          <a:effectRef idx="1">
+            <a:schemeClr val="dk1"/>
+          </a:effectRef>
+          <a:fontRef idx="minor">
+            <a:schemeClr val="tx1"/>
+          </a:fontRef>
+        </p:style>
+      </p:cxnSp>
+      <p:cxnSp>
+        <p:nvCxnSpPr>
+          <p:cNvPr id="103" name="Straight Connector 102">
+            <a:extLst>
+              <a:ext uri="{FF2B5EF4-FFF2-40B4-BE49-F238E27FC236}">
+                <a16:creationId xmlns:a16="http://schemas.microsoft.com/office/drawing/2014/main" id="{412DE9C5-A644-4FA8-BA9F-AA3E2C07BCED}"/>
+              </a:ext>
+            </a:extLst>
+          </p:cNvPr>
+          <p:cNvCxnSpPr>
+            <a:cxnSpLocks/>
+            <a:stCxn id="28" idx="0"/>
+            <a:endCxn id="20" idx="2"/>
+          </p:cNvCxnSpPr>
+          <p:nvPr/>
+        </p:nvCxnSpPr>
+        <p:spPr>
+          <a:xfrm flipH="1" flipV="1">
+            <a:off x="7183658" y="4120557"/>
+            <a:ext cx="725253" cy="828621"/>
+          </a:xfrm>
+          <a:prstGeom prst="line">
+            <a:avLst/>
+          </a:prstGeom>
+          <a:ln w="76200" cmpd="dbl">
+            <a:headEnd type="none" w="sm" len="sm"/>
+          </a:ln>
+        </p:spPr>
+        <p:style>
+          <a:lnRef idx="2">
+            <a:schemeClr val="dk1"/>
+          </a:lnRef>
+          <a:fillRef idx="0">
+            <a:schemeClr val="dk1"/>
+          </a:fillRef>
+          <a:effectRef idx="1">
+            <a:schemeClr val="dk1"/>
+          </a:effectRef>
+          <a:fontRef idx="minor">
+            <a:schemeClr val="tx1"/>
+          </a:fontRef>
+        </p:style>
+      </p:cxnSp>
+      <p:sp>
+        <p:nvSpPr>
+          <p:cNvPr id="130" name="Diamond 129">
+            <a:extLst>
+              <a:ext uri="{FF2B5EF4-FFF2-40B4-BE49-F238E27FC236}">
+                <a16:creationId xmlns:a16="http://schemas.microsoft.com/office/drawing/2014/main" id="{9B5866FA-156B-4192-AC42-307F1E37C46A}"/>
+              </a:ext>
+            </a:extLst>
+          </p:cNvPr>
+          <p:cNvSpPr/>
+          <p:nvPr/>
+        </p:nvSpPr>
+        <p:spPr>
+          <a:xfrm>
+            <a:off x="5448517" y="648732"/>
+            <a:ext cx="2819012" cy="763594"/>
+          </a:xfrm>
+          <a:prstGeom prst="diamond">
+            <a:avLst/>
+          </a:prstGeom>
+        </p:spPr>
+        <p:style>
+          <a:lnRef idx="2">
+            <a:schemeClr val="dk1"/>
+          </a:lnRef>
+          <a:fillRef idx="1">
+            <a:schemeClr val="lt1"/>
+          </a:fillRef>
+          <a:effectRef idx="0">
+            <a:schemeClr val="dk1"/>
+          </a:effectRef>
+          <a:fontRef idx="minor">
+            <a:schemeClr val="dk1"/>
+          </a:fontRef>
+        </p:style>
+        <p:txBody>
+          <a:bodyPr rtlCol="0" anchor="ctr"/>
+          <a:lstStyle/>
+          <a:p>
+            <a:pPr algn="ctr"/>
+            <a:r>
+              <a:rPr lang="en-GB" dirty="0" err="1">
+                <a:latin typeface="Consolas" panose="020B0609020204030204" pitchFamily="49" charset="0"/>
+              </a:rPr>
+              <a:t>PreferredTransport</a:t>
+            </a:r>
+            <a:r>
+              <a:rPr lang="en-GB" dirty="0">
+                <a:latin typeface="Consolas" panose="020B0609020204030204" pitchFamily="49" charset="0"/>
+              </a:rPr>
+              <a:t> </a:t>
+            </a:r>
+          </a:p>
+        </p:txBody>
+      </p:sp>
+      <p:sp>
+        <p:nvSpPr>
+          <p:cNvPr id="134" name="Rectangle 133">
+            <a:extLst>
+              <a:ext uri="{FF2B5EF4-FFF2-40B4-BE49-F238E27FC236}">
+                <a16:creationId xmlns:a16="http://schemas.microsoft.com/office/drawing/2014/main" id="{D35B413E-BB85-4B9D-AE65-8D244F93FBB6}"/>
+              </a:ext>
+            </a:extLst>
+          </p:cNvPr>
+          <p:cNvSpPr/>
+          <p:nvPr/>
+        </p:nvSpPr>
+        <p:spPr>
+          <a:xfrm>
+            <a:off x="5815524" y="-397798"/>
+            <a:ext cx="2097298" cy="676877"/>
+          </a:xfrm>
+          <a:prstGeom prst="rect">
+            <a:avLst/>
+          </a:prstGeom>
+        </p:spPr>
+        <p:style>
+          <a:lnRef idx="2">
+            <a:schemeClr val="dk1"/>
+          </a:lnRef>
+          <a:fillRef idx="1">
+            <a:schemeClr val="lt1"/>
+          </a:fillRef>
+          <a:effectRef idx="0">
+            <a:schemeClr val="dk1"/>
+          </a:effectRef>
+          <a:fontRef idx="minor">
+            <a:schemeClr val="dk1"/>
+          </a:fontRef>
+        </p:style>
+        <p:txBody>
+          <a:bodyPr rtlCol="0" anchor="ctr"/>
+          <a:lstStyle/>
+          <a:p>
+            <a:pPr algn="ctr"/>
+            <a:r>
+              <a:rPr lang="en-GB" dirty="0" err="1">
+                <a:latin typeface="Consolas" panose="020B0609020204030204" pitchFamily="49" charset="0"/>
+              </a:rPr>
+              <a:t>ModeOfTransport</a:t>
+            </a:r>
+            <a:endParaRPr lang="en-GB" dirty="0">
+              <a:latin typeface="Consolas" panose="020B0609020204030204" pitchFamily="49" charset="0"/>
+            </a:endParaRPr>
+          </a:p>
+        </p:txBody>
+      </p:sp>
+      <p:cxnSp>
+        <p:nvCxnSpPr>
+          <p:cNvPr id="135" name="Straight Connector 134">
+            <a:extLst>
+              <a:ext uri="{FF2B5EF4-FFF2-40B4-BE49-F238E27FC236}">
+                <a16:creationId xmlns:a16="http://schemas.microsoft.com/office/drawing/2014/main" id="{2BF9BF5E-813D-4BD1-9FCE-808F6ABF0206}"/>
+              </a:ext>
+            </a:extLst>
+          </p:cNvPr>
+          <p:cNvCxnSpPr>
+            <a:cxnSpLocks/>
+            <a:stCxn id="134" idx="2"/>
+            <a:endCxn id="130" idx="0"/>
+          </p:cNvCxnSpPr>
+          <p:nvPr/>
+        </p:nvCxnSpPr>
+        <p:spPr>
+          <a:xfrm flipH="1">
+            <a:off x="6858023" y="279079"/>
+            <a:ext cx="6150" cy="369653"/>
+          </a:xfrm>
+          <a:prstGeom prst="line">
+            <a:avLst/>
+          </a:prstGeom>
+          <a:ln w="15875">
+            <a:headEnd type="none" w="lg" len="lg"/>
+          </a:ln>
+        </p:spPr>
+        <p:style>
+          <a:lnRef idx="2">
+            <a:schemeClr val="dk1"/>
+          </a:lnRef>
+          <a:fillRef idx="0">
+            <a:schemeClr val="dk1"/>
+          </a:fillRef>
+          <a:effectRef idx="1">
+            <a:schemeClr val="dk1"/>
+          </a:effectRef>
+          <a:fontRef idx="minor">
+            <a:schemeClr val="tx1"/>
+          </a:fontRef>
+        </p:style>
+      </p:cxnSp>
+      <p:sp>
+        <p:nvSpPr>
+          <p:cNvPr id="149" name="Oval 148">
+            <a:extLst>
+              <a:ext uri="{FF2B5EF4-FFF2-40B4-BE49-F238E27FC236}">
+                <a16:creationId xmlns:a16="http://schemas.microsoft.com/office/drawing/2014/main" id="{96CB76E9-6437-42AE-9AE1-15D8D4B27F51}"/>
+              </a:ext>
+            </a:extLst>
+          </p:cNvPr>
+          <p:cNvSpPr/>
+          <p:nvPr/>
+        </p:nvSpPr>
+        <p:spPr>
+          <a:xfrm>
+            <a:off x="6059855" y="-1271656"/>
+            <a:ext cx="1620358" cy="597244"/>
+          </a:xfrm>
+          <a:prstGeom prst="ellipse">
+            <a:avLst/>
+          </a:prstGeom>
+        </p:spPr>
+        <p:style>
+          <a:lnRef idx="2">
+            <a:schemeClr val="dk1"/>
+          </a:lnRef>
+          <a:fillRef idx="1">
+            <a:schemeClr val="lt1"/>
+          </a:fillRef>
+          <a:effectRef idx="0">
+            <a:schemeClr val="dk1"/>
+          </a:effectRef>
+          <a:fontRef idx="minor">
+            <a:schemeClr val="dk1"/>
+          </a:fontRef>
+        </p:style>
+        <p:txBody>
+          <a:bodyPr rtlCol="0" anchor="ctr"/>
+          <a:lstStyle/>
+          <a:p>
+            <a:pPr algn="ctr"/>
+            <a:r>
+              <a:rPr lang="en-US" sz="1600" u="sng" dirty="0"/>
+              <a:t>transport</a:t>
+            </a:r>
+            <a:endParaRPr lang="en-GB" sz="1600" u="sng" dirty="0"/>
+          </a:p>
+        </p:txBody>
+      </p:sp>
+      <p:cxnSp>
+        <p:nvCxnSpPr>
+          <p:cNvPr id="150" name="Straight Connector 149">
+            <a:extLst>
+              <a:ext uri="{FF2B5EF4-FFF2-40B4-BE49-F238E27FC236}">
+                <a16:creationId xmlns:a16="http://schemas.microsoft.com/office/drawing/2014/main" id="{1CC8254D-1B97-473C-B6BA-5D5158CF8233}"/>
+              </a:ext>
+            </a:extLst>
+          </p:cNvPr>
+          <p:cNvCxnSpPr>
+            <a:cxnSpLocks/>
+            <a:stCxn id="134" idx="0"/>
+            <a:endCxn id="149" idx="4"/>
+          </p:cNvCxnSpPr>
+          <p:nvPr/>
+        </p:nvCxnSpPr>
+        <p:spPr>
           <a:xfrm flipV="1">
-            <a:off x="11604854" y="1659701"/>
-            <a:ext cx="0" cy="441778"/>
+            <a:off x="6864173" y="-674412"/>
+            <a:ext cx="5861" cy="276614"/>
           </a:xfrm>
           <a:prstGeom prst="line">
             <a:avLst/>
@@ -16824,6 +17066,953 @@
           </a:fontRef>
         </p:style>
       </p:cxnSp>
+      <p:cxnSp>
+        <p:nvCxnSpPr>
+          <p:cNvPr id="162" name="Straight Connector 161">
+            <a:extLst>
+              <a:ext uri="{FF2B5EF4-FFF2-40B4-BE49-F238E27FC236}">
+                <a16:creationId xmlns:a16="http://schemas.microsoft.com/office/drawing/2014/main" id="{7EB5E82C-56E8-4B71-9473-01EF755F7BA1}"/>
+              </a:ext>
+            </a:extLst>
+          </p:cNvPr>
+          <p:cNvCxnSpPr>
+            <a:cxnSpLocks/>
+            <a:stCxn id="20" idx="0"/>
+            <a:endCxn id="130" idx="2"/>
+          </p:cNvCxnSpPr>
+          <p:nvPr/>
+        </p:nvCxnSpPr>
+        <p:spPr>
+          <a:xfrm flipH="1" flipV="1">
+            <a:off x="6858023" y="1412326"/>
+            <a:ext cx="325635" cy="2110554"/>
+          </a:xfrm>
+          <a:prstGeom prst="line">
+            <a:avLst/>
+          </a:prstGeom>
+          <a:ln w="15875"/>
+        </p:spPr>
+        <p:style>
+          <a:lnRef idx="2">
+            <a:schemeClr val="dk1"/>
+          </a:lnRef>
+          <a:fillRef idx="0">
+            <a:schemeClr val="dk1"/>
+          </a:fillRef>
+          <a:effectRef idx="1">
+            <a:schemeClr val="dk1"/>
+          </a:effectRef>
+          <a:fontRef idx="minor">
+            <a:schemeClr val="tx1"/>
+          </a:fontRef>
+        </p:style>
+      </p:cxnSp>
+      <p:sp>
+        <p:nvSpPr>
+          <p:cNvPr id="166" name="Diamond 165">
+            <a:extLst>
+              <a:ext uri="{FF2B5EF4-FFF2-40B4-BE49-F238E27FC236}">
+                <a16:creationId xmlns:a16="http://schemas.microsoft.com/office/drawing/2014/main" id="{084701F7-1BAF-4921-9DFE-7E2A1E15609E}"/>
+              </a:ext>
+            </a:extLst>
+          </p:cNvPr>
+          <p:cNvSpPr/>
+          <p:nvPr/>
+        </p:nvSpPr>
+        <p:spPr>
+          <a:xfrm>
+            <a:off x="10309220" y="679662"/>
+            <a:ext cx="3863724" cy="884629"/>
+          </a:xfrm>
+          <a:prstGeom prst="diamond">
+            <a:avLst/>
+          </a:prstGeom>
+        </p:spPr>
+        <p:style>
+          <a:lnRef idx="2">
+            <a:schemeClr val="dk1"/>
+          </a:lnRef>
+          <a:fillRef idx="1">
+            <a:schemeClr val="lt1"/>
+          </a:fillRef>
+          <a:effectRef idx="0">
+            <a:schemeClr val="dk1"/>
+          </a:effectRef>
+          <a:fontRef idx="minor">
+            <a:schemeClr val="dk1"/>
+          </a:fontRef>
+        </p:style>
+        <p:txBody>
+          <a:bodyPr rtlCol="0" anchor="ctr"/>
+          <a:lstStyle/>
+          <a:p>
+            <a:pPr algn="ctr"/>
+            <a:r>
+              <a:rPr lang="en-GB" dirty="0" err="1">
+                <a:latin typeface="Consolas" panose="020B0609020204030204" pitchFamily="49" charset="0"/>
+              </a:rPr>
+              <a:t>PreferredModeOfPayment</a:t>
+            </a:r>
+            <a:r>
+              <a:rPr lang="en-GB" dirty="0">
+                <a:latin typeface="Consolas" panose="020B0609020204030204" pitchFamily="49" charset="0"/>
+              </a:rPr>
+              <a:t> </a:t>
+            </a:r>
+          </a:p>
+        </p:txBody>
+      </p:sp>
+      <p:sp>
+        <p:nvSpPr>
+          <p:cNvPr id="167" name="Rectangle 166">
+            <a:extLst>
+              <a:ext uri="{FF2B5EF4-FFF2-40B4-BE49-F238E27FC236}">
+                <a16:creationId xmlns:a16="http://schemas.microsoft.com/office/drawing/2014/main" id="{4D1EBA5E-5FCD-44B0-96CA-A0DE3665F3E1}"/>
+              </a:ext>
+            </a:extLst>
+          </p:cNvPr>
+          <p:cNvSpPr/>
+          <p:nvPr/>
+        </p:nvSpPr>
+        <p:spPr>
+          <a:xfrm>
+            <a:off x="11180683" y="-308426"/>
+            <a:ext cx="2097298" cy="676877"/>
+          </a:xfrm>
+          <a:prstGeom prst="rect">
+            <a:avLst/>
+          </a:prstGeom>
+        </p:spPr>
+        <p:style>
+          <a:lnRef idx="2">
+            <a:schemeClr val="dk1"/>
+          </a:lnRef>
+          <a:fillRef idx="1">
+            <a:schemeClr val="lt1"/>
+          </a:fillRef>
+          <a:effectRef idx="0">
+            <a:schemeClr val="dk1"/>
+          </a:effectRef>
+          <a:fontRef idx="minor">
+            <a:schemeClr val="dk1"/>
+          </a:fontRef>
+        </p:style>
+        <p:txBody>
+          <a:bodyPr rtlCol="0" anchor="ctr"/>
+          <a:lstStyle/>
+          <a:p>
+            <a:pPr algn="ctr"/>
+            <a:r>
+              <a:rPr lang="en-GB" dirty="0" err="1">
+                <a:latin typeface="Consolas" panose="020B0609020204030204" pitchFamily="49" charset="0"/>
+              </a:rPr>
+              <a:t>ModeOfPayment</a:t>
+            </a:r>
+            <a:endParaRPr lang="en-GB" dirty="0">
+              <a:latin typeface="Consolas" panose="020B0609020204030204" pitchFamily="49" charset="0"/>
+            </a:endParaRPr>
+          </a:p>
+        </p:txBody>
+      </p:sp>
+      <p:cxnSp>
+        <p:nvCxnSpPr>
+          <p:cNvPr id="168" name="Straight Connector 167">
+            <a:extLst>
+              <a:ext uri="{FF2B5EF4-FFF2-40B4-BE49-F238E27FC236}">
+                <a16:creationId xmlns:a16="http://schemas.microsoft.com/office/drawing/2014/main" id="{182DF9C3-CE0A-4819-ABE8-BCC7BBE60DB5}"/>
+              </a:ext>
+            </a:extLst>
+          </p:cNvPr>
+          <p:cNvCxnSpPr>
+            <a:cxnSpLocks/>
+            <a:stCxn id="167" idx="2"/>
+            <a:endCxn id="166" idx="0"/>
+          </p:cNvCxnSpPr>
+          <p:nvPr/>
+        </p:nvCxnSpPr>
+        <p:spPr>
+          <a:xfrm>
+            <a:off x="12229332" y="368451"/>
+            <a:ext cx="11750" cy="311211"/>
+          </a:xfrm>
+          <a:prstGeom prst="line">
+            <a:avLst/>
+          </a:prstGeom>
+          <a:ln w="15875">
+            <a:headEnd type="none" w="lg" len="lg"/>
+          </a:ln>
+        </p:spPr>
+        <p:style>
+          <a:lnRef idx="2">
+            <a:schemeClr val="dk1"/>
+          </a:lnRef>
+          <a:fillRef idx="0">
+            <a:schemeClr val="dk1"/>
+          </a:fillRef>
+          <a:effectRef idx="1">
+            <a:schemeClr val="dk1"/>
+          </a:effectRef>
+          <a:fontRef idx="minor">
+            <a:schemeClr val="tx1"/>
+          </a:fontRef>
+        </p:style>
+      </p:cxnSp>
+      <p:sp>
+        <p:nvSpPr>
+          <p:cNvPr id="169" name="Oval 168">
+            <a:extLst>
+              <a:ext uri="{FF2B5EF4-FFF2-40B4-BE49-F238E27FC236}">
+                <a16:creationId xmlns:a16="http://schemas.microsoft.com/office/drawing/2014/main" id="{4B65D1E5-F979-426E-A5F2-E60EE707E50D}"/>
+              </a:ext>
+            </a:extLst>
+          </p:cNvPr>
+          <p:cNvSpPr/>
+          <p:nvPr/>
+        </p:nvSpPr>
+        <p:spPr>
+          <a:xfrm>
+            <a:off x="11076433" y="-1214545"/>
+            <a:ext cx="2293498" cy="540000"/>
+          </a:xfrm>
+          <a:prstGeom prst="ellipse">
+            <a:avLst/>
+          </a:prstGeom>
+        </p:spPr>
+        <p:style>
+          <a:lnRef idx="2">
+            <a:schemeClr val="dk1"/>
+          </a:lnRef>
+          <a:fillRef idx="1">
+            <a:schemeClr val="lt1"/>
+          </a:fillRef>
+          <a:effectRef idx="0">
+            <a:schemeClr val="dk1"/>
+          </a:effectRef>
+          <a:fontRef idx="minor">
+            <a:schemeClr val="dk1"/>
+          </a:fontRef>
+        </p:style>
+        <p:txBody>
+          <a:bodyPr rtlCol="0" anchor="ctr"/>
+          <a:lstStyle/>
+          <a:p>
+            <a:pPr algn="ctr"/>
+            <a:r>
+              <a:rPr lang="en-US" sz="1600" u="sng" dirty="0" err="1"/>
+              <a:t>modeOfPayment</a:t>
+            </a:r>
+            <a:endParaRPr lang="en-GB" sz="1600" u="sng" dirty="0"/>
+          </a:p>
+        </p:txBody>
+      </p:sp>
+      <p:cxnSp>
+        <p:nvCxnSpPr>
+          <p:cNvPr id="170" name="Straight Connector 169">
+            <a:extLst>
+              <a:ext uri="{FF2B5EF4-FFF2-40B4-BE49-F238E27FC236}">
+                <a16:creationId xmlns:a16="http://schemas.microsoft.com/office/drawing/2014/main" id="{19D9A5E6-2E51-4CF4-A4A1-FF78C94926F2}"/>
+              </a:ext>
+            </a:extLst>
+          </p:cNvPr>
+          <p:cNvCxnSpPr>
+            <a:cxnSpLocks/>
+            <a:stCxn id="167" idx="0"/>
+            <a:endCxn id="169" idx="4"/>
+          </p:cNvCxnSpPr>
+          <p:nvPr/>
+        </p:nvCxnSpPr>
+        <p:spPr>
+          <a:xfrm flipH="1" flipV="1">
+            <a:off x="12223182" y="-674545"/>
+            <a:ext cx="6150" cy="366119"/>
+          </a:xfrm>
+          <a:prstGeom prst="line">
+            <a:avLst/>
+          </a:prstGeom>
+          <a:ln w="15875"/>
+        </p:spPr>
+        <p:style>
+          <a:lnRef idx="2">
+            <a:schemeClr val="dk1"/>
+          </a:lnRef>
+          <a:fillRef idx="0">
+            <a:schemeClr val="dk1"/>
+          </a:fillRef>
+          <a:effectRef idx="1">
+            <a:schemeClr val="dk1"/>
+          </a:effectRef>
+          <a:fontRef idx="minor">
+            <a:schemeClr val="tx1"/>
+          </a:fontRef>
+        </p:style>
+      </p:cxnSp>
+      <p:cxnSp>
+        <p:nvCxnSpPr>
+          <p:cNvPr id="171" name="Straight Connector 170">
+            <a:extLst>
+              <a:ext uri="{FF2B5EF4-FFF2-40B4-BE49-F238E27FC236}">
+                <a16:creationId xmlns:a16="http://schemas.microsoft.com/office/drawing/2014/main" id="{6D79B843-E793-4D3E-AA3F-63DBDE33DE55}"/>
+              </a:ext>
+            </a:extLst>
+          </p:cNvPr>
+          <p:cNvCxnSpPr>
+            <a:cxnSpLocks/>
+            <a:stCxn id="20" idx="0"/>
+            <a:endCxn id="166" idx="2"/>
+          </p:cNvCxnSpPr>
+          <p:nvPr/>
+        </p:nvCxnSpPr>
+        <p:spPr>
+          <a:xfrm flipV="1">
+            <a:off x="7183658" y="1564291"/>
+            <a:ext cx="5057424" cy="1958589"/>
+          </a:xfrm>
+          <a:prstGeom prst="line">
+            <a:avLst/>
+          </a:prstGeom>
+          <a:ln w="15875"/>
+        </p:spPr>
+        <p:style>
+          <a:lnRef idx="2">
+            <a:schemeClr val="dk1"/>
+          </a:lnRef>
+          <a:fillRef idx="0">
+            <a:schemeClr val="dk1"/>
+          </a:fillRef>
+          <a:effectRef idx="1">
+            <a:schemeClr val="dk1"/>
+          </a:effectRef>
+          <a:fontRef idx="minor">
+            <a:schemeClr val="tx1"/>
+          </a:fontRef>
+        </p:style>
+      </p:cxnSp>
+      <p:sp>
+        <p:nvSpPr>
+          <p:cNvPr id="174" name="Diamond 173">
+            <a:extLst>
+              <a:ext uri="{FF2B5EF4-FFF2-40B4-BE49-F238E27FC236}">
+                <a16:creationId xmlns:a16="http://schemas.microsoft.com/office/drawing/2014/main" id="{B02931FD-D159-49F8-9618-B160DB553641}"/>
+              </a:ext>
+            </a:extLst>
+          </p:cNvPr>
+          <p:cNvSpPr/>
+          <p:nvPr/>
+        </p:nvSpPr>
+        <p:spPr>
+          <a:xfrm>
+            <a:off x="8198793" y="88643"/>
+            <a:ext cx="2218844" cy="847382"/>
+          </a:xfrm>
+          <a:prstGeom prst="diamond">
+            <a:avLst/>
+          </a:prstGeom>
+        </p:spPr>
+        <p:style>
+          <a:lnRef idx="2">
+            <a:schemeClr val="dk1"/>
+          </a:lnRef>
+          <a:fillRef idx="1">
+            <a:schemeClr val="lt1"/>
+          </a:fillRef>
+          <a:effectRef idx="0">
+            <a:schemeClr val="dk1"/>
+          </a:effectRef>
+          <a:fontRef idx="minor">
+            <a:schemeClr val="dk1"/>
+          </a:fontRef>
+        </p:style>
+        <p:txBody>
+          <a:bodyPr rtlCol="0" anchor="ctr"/>
+          <a:lstStyle/>
+          <a:p>
+            <a:pPr algn="ctr"/>
+            <a:r>
+              <a:rPr lang="en-GB" dirty="0">
+                <a:latin typeface="Consolas" panose="020B0609020204030204" pitchFamily="49" charset="0"/>
+              </a:rPr>
+              <a:t>Earns</a:t>
+            </a:r>
+          </a:p>
+        </p:txBody>
+      </p:sp>
+      <p:sp>
+        <p:nvSpPr>
+          <p:cNvPr id="178" name="Rectangle 177">
+            <a:extLst>
+              <a:ext uri="{FF2B5EF4-FFF2-40B4-BE49-F238E27FC236}">
+                <a16:creationId xmlns:a16="http://schemas.microsoft.com/office/drawing/2014/main" id="{2C49462D-36BA-42FC-8E05-B7B17333096E}"/>
+              </a:ext>
+            </a:extLst>
+          </p:cNvPr>
+          <p:cNvSpPr/>
+          <p:nvPr/>
+        </p:nvSpPr>
+        <p:spPr>
+          <a:xfrm>
+            <a:off x="8445749" y="-1028998"/>
+            <a:ext cx="1724932" cy="676877"/>
+          </a:xfrm>
+          <a:prstGeom prst="rect">
+            <a:avLst/>
+          </a:prstGeom>
+        </p:spPr>
+        <p:style>
+          <a:lnRef idx="2">
+            <a:schemeClr val="dk1"/>
+          </a:lnRef>
+          <a:fillRef idx="1">
+            <a:schemeClr val="lt1"/>
+          </a:fillRef>
+          <a:effectRef idx="0">
+            <a:schemeClr val="dk1"/>
+          </a:effectRef>
+          <a:fontRef idx="minor">
+            <a:schemeClr val="dk1"/>
+          </a:fontRef>
+        </p:style>
+        <p:txBody>
+          <a:bodyPr rtlCol="0" anchor="ctr"/>
+          <a:lstStyle/>
+          <a:p>
+            <a:pPr algn="ctr"/>
+            <a:r>
+              <a:rPr lang="en-GB" dirty="0">
+                <a:latin typeface="Consolas" panose="020B0609020204030204" pitchFamily="49" charset="0"/>
+              </a:rPr>
+              <a:t>Salary</a:t>
+            </a:r>
+          </a:p>
+        </p:txBody>
+      </p:sp>
+      <p:cxnSp>
+        <p:nvCxnSpPr>
+          <p:cNvPr id="179" name="Straight Connector 178">
+            <a:extLst>
+              <a:ext uri="{FF2B5EF4-FFF2-40B4-BE49-F238E27FC236}">
+                <a16:creationId xmlns:a16="http://schemas.microsoft.com/office/drawing/2014/main" id="{44885F80-2ADD-4AE2-8757-B1B98A27772F}"/>
+              </a:ext>
+            </a:extLst>
+          </p:cNvPr>
+          <p:cNvCxnSpPr>
+            <a:cxnSpLocks/>
+            <a:stCxn id="178" idx="2"/>
+            <a:endCxn id="174" idx="0"/>
+          </p:cNvCxnSpPr>
+          <p:nvPr/>
+        </p:nvCxnSpPr>
+        <p:spPr>
+          <a:xfrm>
+            <a:off x="9308215" y="-352121"/>
+            <a:ext cx="0" cy="440764"/>
+          </a:xfrm>
+          <a:prstGeom prst="line">
+            <a:avLst/>
+          </a:prstGeom>
+          <a:ln w="15875">
+            <a:headEnd type="none" w="lg" len="lg"/>
+          </a:ln>
+        </p:spPr>
+        <p:style>
+          <a:lnRef idx="2">
+            <a:schemeClr val="dk1"/>
+          </a:lnRef>
+          <a:fillRef idx="0">
+            <a:schemeClr val="dk1"/>
+          </a:fillRef>
+          <a:effectRef idx="1">
+            <a:schemeClr val="dk1"/>
+          </a:effectRef>
+          <a:fontRef idx="minor">
+            <a:schemeClr val="tx1"/>
+          </a:fontRef>
+        </p:style>
+      </p:cxnSp>
+      <p:sp>
+        <p:nvSpPr>
+          <p:cNvPr id="180" name="Oval 179">
+            <a:extLst>
+              <a:ext uri="{FF2B5EF4-FFF2-40B4-BE49-F238E27FC236}">
+                <a16:creationId xmlns:a16="http://schemas.microsoft.com/office/drawing/2014/main" id="{2B992FBC-0254-4F9C-A97D-08E067034F30}"/>
+              </a:ext>
+            </a:extLst>
+          </p:cNvPr>
+          <p:cNvSpPr/>
+          <p:nvPr/>
+        </p:nvSpPr>
+        <p:spPr>
+          <a:xfrm>
+            <a:off x="7133696" y="-2719550"/>
+            <a:ext cx="1173416" cy="443680"/>
+          </a:xfrm>
+          <a:prstGeom prst="ellipse">
+            <a:avLst/>
+          </a:prstGeom>
+        </p:spPr>
+        <p:style>
+          <a:lnRef idx="2">
+            <a:schemeClr val="dk1"/>
+          </a:lnRef>
+          <a:fillRef idx="1">
+            <a:schemeClr val="lt1"/>
+          </a:fillRef>
+          <a:effectRef idx="0">
+            <a:schemeClr val="dk1"/>
+          </a:effectRef>
+          <a:fontRef idx="minor">
+            <a:schemeClr val="dk1"/>
+          </a:fontRef>
+        </p:style>
+        <p:txBody>
+          <a:bodyPr rtlCol="0" anchor="ctr"/>
+          <a:lstStyle/>
+          <a:p>
+            <a:pPr algn="ctr"/>
+            <a:r>
+              <a:rPr lang="en-US" sz="1600" u="sng" dirty="0"/>
+              <a:t>year</a:t>
+            </a:r>
+            <a:endParaRPr lang="en-GB" sz="1600" u="sng" dirty="0"/>
+          </a:p>
+        </p:txBody>
+      </p:sp>
+      <p:cxnSp>
+        <p:nvCxnSpPr>
+          <p:cNvPr id="181" name="Straight Connector 180">
+            <a:extLst>
+              <a:ext uri="{FF2B5EF4-FFF2-40B4-BE49-F238E27FC236}">
+                <a16:creationId xmlns:a16="http://schemas.microsoft.com/office/drawing/2014/main" id="{1548F65E-33DF-417F-AA13-399768F5E07F}"/>
+              </a:ext>
+            </a:extLst>
+          </p:cNvPr>
+          <p:cNvCxnSpPr>
+            <a:cxnSpLocks/>
+            <a:stCxn id="178" idx="0"/>
+            <a:endCxn id="180" idx="4"/>
+          </p:cNvCxnSpPr>
+          <p:nvPr/>
+        </p:nvCxnSpPr>
+        <p:spPr>
+          <a:xfrm flipH="1" flipV="1">
+            <a:off x="7720404" y="-2275870"/>
+            <a:ext cx="1587811" cy="1246872"/>
+          </a:xfrm>
+          <a:prstGeom prst="line">
+            <a:avLst/>
+          </a:prstGeom>
+          <a:ln w="15875"/>
+        </p:spPr>
+        <p:style>
+          <a:lnRef idx="2">
+            <a:schemeClr val="dk1"/>
+          </a:lnRef>
+          <a:fillRef idx="0">
+            <a:schemeClr val="dk1"/>
+          </a:fillRef>
+          <a:effectRef idx="1">
+            <a:schemeClr val="dk1"/>
+          </a:effectRef>
+          <a:fontRef idx="minor">
+            <a:schemeClr val="tx1"/>
+          </a:fontRef>
+        </p:style>
+      </p:cxnSp>
+      <p:cxnSp>
+        <p:nvCxnSpPr>
+          <p:cNvPr id="185" name="Straight Connector 184">
+            <a:extLst>
+              <a:ext uri="{FF2B5EF4-FFF2-40B4-BE49-F238E27FC236}">
+                <a16:creationId xmlns:a16="http://schemas.microsoft.com/office/drawing/2014/main" id="{5B26DCDF-CA39-410B-826B-3A250000653B}"/>
+              </a:ext>
+            </a:extLst>
+          </p:cNvPr>
+          <p:cNvCxnSpPr>
+            <a:cxnSpLocks/>
+            <a:stCxn id="20" idx="0"/>
+            <a:endCxn id="174" idx="2"/>
+          </p:cNvCxnSpPr>
+          <p:nvPr/>
+        </p:nvCxnSpPr>
+        <p:spPr>
+          <a:xfrm flipV="1">
+            <a:off x="7183658" y="936025"/>
+            <a:ext cx="2124557" cy="2586855"/>
+          </a:xfrm>
+          <a:prstGeom prst="line">
+            <a:avLst/>
+          </a:prstGeom>
+          <a:ln w="15875"/>
+        </p:spPr>
+        <p:style>
+          <a:lnRef idx="2">
+            <a:schemeClr val="dk1"/>
+          </a:lnRef>
+          <a:fillRef idx="0">
+            <a:schemeClr val="dk1"/>
+          </a:fillRef>
+          <a:effectRef idx="1">
+            <a:schemeClr val="dk1"/>
+          </a:effectRef>
+          <a:fontRef idx="minor">
+            <a:schemeClr val="tx1"/>
+          </a:fontRef>
+        </p:style>
+      </p:cxnSp>
+      <p:cxnSp>
+        <p:nvCxnSpPr>
+          <p:cNvPr id="191" name="Straight Connector 190">
+            <a:extLst>
+              <a:ext uri="{FF2B5EF4-FFF2-40B4-BE49-F238E27FC236}">
+                <a16:creationId xmlns:a16="http://schemas.microsoft.com/office/drawing/2014/main" id="{72FACAC4-E3E0-4112-99B2-BFDC99DCCFCF}"/>
+              </a:ext>
+            </a:extLst>
+          </p:cNvPr>
+          <p:cNvCxnSpPr>
+            <a:cxnSpLocks/>
+            <a:stCxn id="178" idx="0"/>
+            <a:endCxn id="197" idx="5"/>
+          </p:cNvCxnSpPr>
+          <p:nvPr/>
+        </p:nvCxnSpPr>
+        <p:spPr>
+          <a:xfrm flipH="1" flipV="1">
+            <a:off x="7174642" y="-1890737"/>
+            <a:ext cx="2133573" cy="861739"/>
+          </a:xfrm>
+          <a:prstGeom prst="line">
+            <a:avLst/>
+          </a:prstGeom>
+          <a:ln w="15875"/>
+        </p:spPr>
+        <p:style>
+          <a:lnRef idx="2">
+            <a:schemeClr val="dk1"/>
+          </a:lnRef>
+          <a:fillRef idx="0">
+            <a:schemeClr val="dk1"/>
+          </a:fillRef>
+          <a:effectRef idx="1">
+            <a:schemeClr val="dk1"/>
+          </a:effectRef>
+          <a:fontRef idx="minor">
+            <a:schemeClr val="tx1"/>
+          </a:fontRef>
+        </p:style>
+      </p:cxnSp>
+      <p:cxnSp>
+        <p:nvCxnSpPr>
+          <p:cNvPr id="195" name="Straight Connector 194">
+            <a:extLst>
+              <a:ext uri="{FF2B5EF4-FFF2-40B4-BE49-F238E27FC236}">
+                <a16:creationId xmlns:a16="http://schemas.microsoft.com/office/drawing/2014/main" id="{CF508535-EE50-4992-8647-1DCB80340F1A}"/>
+              </a:ext>
+            </a:extLst>
+          </p:cNvPr>
+          <p:cNvCxnSpPr>
+            <a:cxnSpLocks/>
+            <a:stCxn id="198" idx="4"/>
+            <a:endCxn id="178" idx="0"/>
+          </p:cNvCxnSpPr>
+          <p:nvPr/>
+        </p:nvCxnSpPr>
+        <p:spPr>
+          <a:xfrm>
+            <a:off x="9262104" y="-2343914"/>
+            <a:ext cx="46111" cy="1314916"/>
+          </a:xfrm>
+          <a:prstGeom prst="line">
+            <a:avLst/>
+          </a:prstGeom>
+          <a:ln w="15875"/>
+        </p:spPr>
+        <p:style>
+          <a:lnRef idx="2">
+            <a:schemeClr val="dk1"/>
+          </a:lnRef>
+          <a:fillRef idx="0">
+            <a:schemeClr val="dk1"/>
+          </a:fillRef>
+          <a:effectRef idx="1">
+            <a:schemeClr val="dk1"/>
+          </a:effectRef>
+          <a:fontRef idx="minor">
+            <a:schemeClr val="tx1"/>
+          </a:fontRef>
+        </p:style>
+      </p:cxnSp>
+      <p:sp>
+        <p:nvSpPr>
+          <p:cNvPr id="197" name="Oval 196">
+            <a:extLst>
+              <a:ext uri="{FF2B5EF4-FFF2-40B4-BE49-F238E27FC236}">
+                <a16:creationId xmlns:a16="http://schemas.microsoft.com/office/drawing/2014/main" id="{4D11C4BF-27A2-42A6-944F-532DED38B812}"/>
+              </a:ext>
+            </a:extLst>
+          </p:cNvPr>
+          <p:cNvSpPr/>
+          <p:nvPr/>
+        </p:nvSpPr>
+        <p:spPr>
+          <a:xfrm>
+            <a:off x="6046385" y="-2351656"/>
+            <a:ext cx="1321835" cy="540000"/>
+          </a:xfrm>
+          <a:prstGeom prst="ellipse">
+            <a:avLst/>
+          </a:prstGeom>
+        </p:spPr>
+        <p:style>
+          <a:lnRef idx="2">
+            <a:schemeClr val="dk1"/>
+          </a:lnRef>
+          <a:fillRef idx="1">
+            <a:schemeClr val="lt1"/>
+          </a:fillRef>
+          <a:effectRef idx="0">
+            <a:schemeClr val="dk1"/>
+          </a:effectRef>
+          <a:fontRef idx="minor">
+            <a:schemeClr val="dk1"/>
+          </a:fontRef>
+        </p:style>
+        <p:txBody>
+          <a:bodyPr rtlCol="0" anchor="ctr"/>
+          <a:lstStyle/>
+          <a:p>
+            <a:pPr algn="ctr"/>
+            <a:r>
+              <a:rPr lang="en-GB" sz="1600" u="sng" dirty="0" err="1"/>
+              <a:t>montth</a:t>
+            </a:r>
+            <a:endParaRPr lang="en-GB" sz="1600" u="sng" dirty="0"/>
+          </a:p>
+        </p:txBody>
+      </p:sp>
+      <p:sp>
+        <p:nvSpPr>
+          <p:cNvPr id="198" name="Oval 197">
+            <a:extLst>
+              <a:ext uri="{FF2B5EF4-FFF2-40B4-BE49-F238E27FC236}">
+                <a16:creationId xmlns:a16="http://schemas.microsoft.com/office/drawing/2014/main" id="{5C35C899-35EE-40DD-94BD-B5418ABA5F8B}"/>
+              </a:ext>
+            </a:extLst>
+          </p:cNvPr>
+          <p:cNvSpPr/>
+          <p:nvPr/>
+        </p:nvSpPr>
+        <p:spPr>
+          <a:xfrm>
+            <a:off x="8463614" y="-2883914"/>
+            <a:ext cx="1596979" cy="540000"/>
+          </a:xfrm>
+          <a:prstGeom prst="ellipse">
+            <a:avLst/>
+          </a:prstGeom>
+        </p:spPr>
+        <p:style>
+          <a:lnRef idx="2">
+            <a:schemeClr val="dk1"/>
+          </a:lnRef>
+          <a:fillRef idx="1">
+            <a:schemeClr val="lt1"/>
+          </a:fillRef>
+          <a:effectRef idx="0">
+            <a:schemeClr val="dk1"/>
+          </a:effectRef>
+          <a:fontRef idx="minor">
+            <a:schemeClr val="dk1"/>
+          </a:fontRef>
+        </p:style>
+        <p:txBody>
+          <a:bodyPr rtlCol="0" anchor="ctr"/>
+          <a:lstStyle/>
+          <a:p>
+            <a:pPr algn="ctr"/>
+            <a:r>
+              <a:rPr lang="en-US" sz="1600" dirty="0" err="1"/>
+              <a:t>final_salary</a:t>
+            </a:r>
+            <a:endParaRPr lang="en-GB" sz="1600" dirty="0"/>
+          </a:p>
+        </p:txBody>
+      </p:sp>
+      <p:cxnSp>
+        <p:nvCxnSpPr>
+          <p:cNvPr id="199" name="Straight Connector 198">
+            <a:extLst>
+              <a:ext uri="{FF2B5EF4-FFF2-40B4-BE49-F238E27FC236}">
+                <a16:creationId xmlns:a16="http://schemas.microsoft.com/office/drawing/2014/main" id="{957C4292-FB5E-40FD-A86E-857A3FDA6342}"/>
+              </a:ext>
+            </a:extLst>
+          </p:cNvPr>
+          <p:cNvCxnSpPr>
+            <a:cxnSpLocks/>
+            <a:stCxn id="178" idx="0"/>
+            <a:endCxn id="202" idx="3"/>
+          </p:cNvCxnSpPr>
+          <p:nvPr/>
+        </p:nvCxnSpPr>
+        <p:spPr>
+          <a:xfrm flipV="1">
+            <a:off x="9308215" y="-1833480"/>
+            <a:ext cx="2267465" cy="804482"/>
+          </a:xfrm>
+          <a:prstGeom prst="line">
+            <a:avLst/>
+          </a:prstGeom>
+          <a:ln w="15875"/>
+        </p:spPr>
+        <p:style>
+          <a:lnRef idx="2">
+            <a:schemeClr val="dk1"/>
+          </a:lnRef>
+          <a:fillRef idx="0">
+            <a:schemeClr val="dk1"/>
+          </a:fillRef>
+          <a:effectRef idx="1">
+            <a:schemeClr val="dk1"/>
+          </a:effectRef>
+          <a:fontRef idx="minor">
+            <a:schemeClr val="tx1"/>
+          </a:fontRef>
+        </p:style>
+      </p:cxnSp>
+      <p:sp>
+        <p:nvSpPr>
+          <p:cNvPr id="200" name="Oval 199">
+            <a:extLst>
+              <a:ext uri="{FF2B5EF4-FFF2-40B4-BE49-F238E27FC236}">
+                <a16:creationId xmlns:a16="http://schemas.microsoft.com/office/drawing/2014/main" id="{103ED576-8E82-454B-B9CD-03EEB23ABDDA}"/>
+              </a:ext>
+            </a:extLst>
+          </p:cNvPr>
+          <p:cNvSpPr/>
+          <p:nvPr/>
+        </p:nvSpPr>
+        <p:spPr>
+          <a:xfrm>
+            <a:off x="10144036" y="-2877207"/>
+            <a:ext cx="1636824" cy="540000"/>
+          </a:xfrm>
+          <a:prstGeom prst="ellipse">
+            <a:avLst/>
+          </a:prstGeom>
+        </p:spPr>
+        <p:style>
+          <a:lnRef idx="2">
+            <a:schemeClr val="dk1"/>
+          </a:lnRef>
+          <a:fillRef idx="1">
+            <a:schemeClr val="lt1"/>
+          </a:fillRef>
+          <a:effectRef idx="0">
+            <a:schemeClr val="dk1"/>
+          </a:effectRef>
+          <a:fontRef idx="minor">
+            <a:schemeClr val="dk1"/>
+          </a:fontRef>
+        </p:style>
+        <p:txBody>
+          <a:bodyPr rtlCol="0" anchor="ctr"/>
+          <a:lstStyle/>
+          <a:p>
+            <a:pPr algn="ctr"/>
+            <a:r>
+              <a:rPr lang="en-US" sz="1600" dirty="0" err="1"/>
+              <a:t>petdays</a:t>
+            </a:r>
+            <a:endParaRPr lang="en-GB" sz="1600" dirty="0"/>
+          </a:p>
+        </p:txBody>
+      </p:sp>
+      <p:cxnSp>
+        <p:nvCxnSpPr>
+          <p:cNvPr id="201" name="Straight Connector 200">
+            <a:extLst>
+              <a:ext uri="{FF2B5EF4-FFF2-40B4-BE49-F238E27FC236}">
+                <a16:creationId xmlns:a16="http://schemas.microsoft.com/office/drawing/2014/main" id="{88A18EE3-86F5-4B1B-8F6D-6AD14D3E9F4E}"/>
+              </a:ext>
+            </a:extLst>
+          </p:cNvPr>
+          <p:cNvCxnSpPr>
+            <a:cxnSpLocks/>
+            <a:stCxn id="200" idx="4"/>
+            <a:endCxn id="178" idx="0"/>
+          </p:cNvCxnSpPr>
+          <p:nvPr/>
+        </p:nvCxnSpPr>
+        <p:spPr>
+          <a:xfrm flipH="1">
+            <a:off x="9308215" y="-2337207"/>
+            <a:ext cx="1654233" cy="1308209"/>
+          </a:xfrm>
+          <a:prstGeom prst="line">
+            <a:avLst/>
+          </a:prstGeom>
+          <a:ln w="15875"/>
+        </p:spPr>
+        <p:style>
+          <a:lnRef idx="2">
+            <a:schemeClr val="dk1"/>
+          </a:lnRef>
+          <a:fillRef idx="0">
+            <a:schemeClr val="dk1"/>
+          </a:fillRef>
+          <a:effectRef idx="1">
+            <a:schemeClr val="dk1"/>
+          </a:effectRef>
+          <a:fontRef idx="minor">
+            <a:schemeClr val="tx1"/>
+          </a:fontRef>
+        </p:style>
+      </p:cxnSp>
+      <p:sp>
+        <p:nvSpPr>
+          <p:cNvPr id="202" name="Oval 201">
+            <a:extLst>
+              <a:ext uri="{FF2B5EF4-FFF2-40B4-BE49-F238E27FC236}">
+                <a16:creationId xmlns:a16="http://schemas.microsoft.com/office/drawing/2014/main" id="{90990020-4319-4BE5-9E8B-F6B7DFA4CA6B}"/>
+              </a:ext>
+            </a:extLst>
+          </p:cNvPr>
+          <p:cNvSpPr/>
+          <p:nvPr/>
+        </p:nvSpPr>
+        <p:spPr>
+          <a:xfrm>
+            <a:off x="11382102" y="-2294399"/>
+            <a:ext cx="1321835" cy="540000"/>
+          </a:xfrm>
+          <a:prstGeom prst="ellipse">
+            <a:avLst/>
+          </a:prstGeom>
+        </p:spPr>
+        <p:style>
+          <a:lnRef idx="2">
+            <a:schemeClr val="dk1"/>
+          </a:lnRef>
+          <a:fillRef idx="1">
+            <a:schemeClr val="lt1"/>
+          </a:fillRef>
+          <a:effectRef idx="0">
+            <a:schemeClr val="dk1"/>
+          </a:effectRef>
+          <a:fontRef idx="minor">
+            <a:schemeClr val="dk1"/>
+          </a:fontRef>
+        </p:style>
+        <p:txBody>
+          <a:bodyPr rtlCol="0" anchor="ctr"/>
+          <a:lstStyle/>
+          <a:p>
+            <a:pPr algn="ctr"/>
+            <a:r>
+              <a:rPr lang="en-GB" sz="1600" dirty="0"/>
+              <a:t>earnings</a:t>
+            </a:r>
+          </a:p>
+        </p:txBody>
+      </p:sp>
     </p:spTree>
     <p:extLst>
       <p:ext uri="{BB962C8B-B14F-4D97-AF65-F5344CB8AC3E}">
@@ -17133,21 +18322,6 @@
 </file>
 
 <file path=customXml/item1.xml><?xml version="1.0" encoding="utf-8"?>
-<p:properties xmlns:p="http://schemas.microsoft.com/office/2006/metadata/properties" xmlns:xsi="http://www.w3.org/2001/XMLSchema-instance" xmlns:pc="http://schemas.microsoft.com/office/infopath/2007/PartnerControls">
-  <documentManagement/>
-</p:properties>
-</file>
-
-<file path=customXml/item2.xml><?xml version="1.0" encoding="utf-8"?>
-<?mso-contentType ?>
-<FormTemplates xmlns="http://schemas.microsoft.com/sharepoint/v3/contenttype/forms">
-  <Display>DocumentLibraryForm</Display>
-  <Edit>DocumentLibraryForm</Edit>
-  <New>DocumentLibraryForm</New>
-</FormTemplates>
-</file>
-
-<file path=customXml/item3.xml><?xml version="1.0" encoding="utf-8"?>
 <ct:contentTypeSchema xmlns:ct="http://schemas.microsoft.com/office/2006/metadata/contentType" xmlns:ma="http://schemas.microsoft.com/office/2006/metadata/properties/metaAttributes" ct:_="" ma:_="" ma:contentTypeName="Document" ma:contentTypeID="0x01010006B00701839A694C99426BB45CC69360" ma:contentTypeVersion="9" ma:contentTypeDescription="Create a new document." ma:contentTypeScope="" ma:versionID="e344256978f14a8757a85bed12502daf">
   <xsd:schema xmlns:xsd="http://www.w3.org/2001/XMLSchema" xmlns:xs="http://www.w3.org/2001/XMLSchema" xmlns:p="http://schemas.microsoft.com/office/2006/metadata/properties" xmlns:ns3="b60769e2-796d-4bcb-9a3b-3cbc09cb3c87" targetNamespace="http://schemas.microsoft.com/office/2006/metadata/properties" ma:root="true" ma:fieldsID="62060ec61ee8572ba1899297ee50551f" ns3:_="">
     <xsd:import namespace="b60769e2-796d-4bcb-9a3b-3cbc09cb3c87"/>
@@ -17325,31 +18499,22 @@
 </ct:contentTypeSchema>
 </file>
 
-<file path=customXml/itemProps1.xml><?xml version="1.0" encoding="utf-8"?>
-<ds:datastoreItem xmlns:ds="http://schemas.openxmlformats.org/officeDocument/2006/customXml" ds:itemID="{17AC53AC-F2A9-4103-B84D-A7C0F1E6D282}">
-  <ds:schemaRefs>
-    <ds:schemaRef ds:uri="http://purl.org/dc/terms/"/>
-    <ds:schemaRef ds:uri="b60769e2-796d-4bcb-9a3b-3cbc09cb3c87"/>
-    <ds:schemaRef ds:uri="http://purl.org/dc/dcmitype/"/>
-    <ds:schemaRef ds:uri="http://schemas.microsoft.com/office/infopath/2007/PartnerControls"/>
-    <ds:schemaRef ds:uri="http://purl.org/dc/elements/1.1/"/>
-    <ds:schemaRef ds:uri="http://schemas.microsoft.com/office/2006/documentManagement/types"/>
-    <ds:schemaRef ds:uri="http://schemas.openxmlformats.org/package/2006/metadata/core-properties"/>
-    <ds:schemaRef ds:uri="http://schemas.microsoft.com/office/2006/metadata/properties"/>
-    <ds:schemaRef ds:uri="http://www.w3.org/XML/1998/namespace"/>
-  </ds:schemaRefs>
-</ds:datastoreItem>
+<file path=customXml/item2.xml><?xml version="1.0" encoding="utf-8"?>
+<?mso-contentType ?>
+<FormTemplates xmlns="http://schemas.microsoft.com/sharepoint/v3/contenttype/forms">
+  <Display>DocumentLibraryForm</Display>
+  <Edit>DocumentLibraryForm</Edit>
+  <New>DocumentLibraryForm</New>
+</FormTemplates>
 </file>
 
-<file path=customXml/itemProps2.xml><?xml version="1.0" encoding="utf-8"?>
-<ds:datastoreItem xmlns:ds="http://schemas.openxmlformats.org/officeDocument/2006/customXml" ds:itemID="{9DEC84EE-1729-403C-81F8-386101000A3E}">
-  <ds:schemaRefs>
-    <ds:schemaRef ds:uri="http://schemas.microsoft.com/sharepoint/v3/contenttype/forms"/>
-  </ds:schemaRefs>
-</ds:datastoreItem>
+<file path=customXml/item3.xml><?xml version="1.0" encoding="utf-8"?>
+<p:properties xmlns:p="http://schemas.microsoft.com/office/2006/metadata/properties" xmlns:xsi="http://www.w3.org/2001/XMLSchema-instance" xmlns:pc="http://schemas.microsoft.com/office/infopath/2007/PartnerControls">
+  <documentManagement/>
+</p:properties>
 </file>
 
-<file path=customXml/itemProps3.xml><?xml version="1.0" encoding="utf-8"?>
+<file path=customXml/itemProps1.xml><?xml version="1.0" encoding="utf-8"?>
 <ds:datastoreItem xmlns:ds="http://schemas.openxmlformats.org/officeDocument/2006/customXml" ds:itemID="{54E35DC9-7376-408F-80E6-31E962DA5B88}">
   <ds:schemaRefs>
     <ds:schemaRef ds:uri="http://schemas.microsoft.com/office/2006/metadata/contentType"/>
@@ -17365,4 +18530,28 @@
     <ds:schemaRef ds:uri="http://schemas.microsoft.com/internal/obd"/>
   </ds:schemaRefs>
 </ds:datastoreItem>
+</file>
+
+<file path=customXml/itemProps2.xml><?xml version="1.0" encoding="utf-8"?>
+<ds:datastoreItem xmlns:ds="http://schemas.openxmlformats.org/officeDocument/2006/customXml" ds:itemID="{9DEC84EE-1729-403C-81F8-386101000A3E}">
+  <ds:schemaRefs>
+    <ds:schemaRef ds:uri="http://schemas.microsoft.com/sharepoint/v3/contenttype/forms"/>
+  </ds:schemaRefs>
+</ds:datastoreItem>
+</file>
+
+<file path=customXml/itemProps3.xml><?xml version="1.0" encoding="utf-8"?>
+<ds:datastoreItem xmlns:ds="http://schemas.openxmlformats.org/officeDocument/2006/customXml" ds:itemID="{17AC53AC-F2A9-4103-B84D-A7C0F1E6D282}">
+  <ds:schemaRefs>
+    <ds:schemaRef ds:uri="http://purl.org/dc/terms/"/>
+    <ds:schemaRef ds:uri="b60769e2-796d-4bcb-9a3b-3cbc09cb3c87"/>
+    <ds:schemaRef ds:uri="http://purl.org/dc/dcmitype/"/>
+    <ds:schemaRef ds:uri="http://schemas.microsoft.com/office/infopath/2007/PartnerControls"/>
+    <ds:schemaRef ds:uri="http://purl.org/dc/elements/1.1/"/>
+    <ds:schemaRef ds:uri="http://schemas.microsoft.com/office/2006/documentManagement/types"/>
+    <ds:schemaRef ds:uri="http://schemas.openxmlformats.org/package/2006/metadata/core-properties"/>
+    <ds:schemaRef ds:uri="http://schemas.microsoft.com/office/2006/metadata/properties"/>
+    <ds:schemaRef ds:uri="http://www.w3.org/XML/1998/namespace"/>
+  </ds:schemaRefs>
+</ds:datastoreItem>
 </file>
</xml_diff>

<commit_message>
updated favicon.ico icon for website and a route for '/favicon.ico'
</commit_message>
<xml_diff>
--- a/ER+Diagram(diagram in last slide).pptx
+++ b/ER+Diagram(diagram in last slide).pptx
@@ -269,7 +269,7 @@
           <a:p>
             <a:fld id="{CF2A1630-D6BA-43E0-8E45-4E094A6624F7}" type="datetimeFigureOut">
               <a:rPr lang="en-GB" smtClean="0"/>
-              <a:t>06/11/2020</a:t>
+              <a:t>07/11/2020</a:t>
             </a:fld>
             <a:endParaRPr lang="en-GB"/>
           </a:p>
@@ -469,7 +469,7 @@
           <a:p>
             <a:fld id="{CF2A1630-D6BA-43E0-8E45-4E094A6624F7}" type="datetimeFigureOut">
               <a:rPr lang="en-GB" smtClean="0"/>
-              <a:t>06/11/2020</a:t>
+              <a:t>07/11/2020</a:t>
             </a:fld>
             <a:endParaRPr lang="en-GB"/>
           </a:p>
@@ -679,7 +679,7 @@
           <a:p>
             <a:fld id="{CF2A1630-D6BA-43E0-8E45-4E094A6624F7}" type="datetimeFigureOut">
               <a:rPr lang="en-GB" smtClean="0"/>
-              <a:t>06/11/2020</a:t>
+              <a:t>07/11/2020</a:t>
             </a:fld>
             <a:endParaRPr lang="en-GB"/>
           </a:p>
@@ -879,7 +879,7 @@
           <a:p>
             <a:fld id="{CF2A1630-D6BA-43E0-8E45-4E094A6624F7}" type="datetimeFigureOut">
               <a:rPr lang="en-GB" smtClean="0"/>
-              <a:t>06/11/2020</a:t>
+              <a:t>07/11/2020</a:t>
             </a:fld>
             <a:endParaRPr lang="en-GB"/>
           </a:p>
@@ -1155,7 +1155,7 @@
           <a:p>
             <a:fld id="{CF2A1630-D6BA-43E0-8E45-4E094A6624F7}" type="datetimeFigureOut">
               <a:rPr lang="en-GB" smtClean="0"/>
-              <a:t>06/11/2020</a:t>
+              <a:t>07/11/2020</a:t>
             </a:fld>
             <a:endParaRPr lang="en-GB"/>
           </a:p>
@@ -1423,7 +1423,7 @@
           <a:p>
             <a:fld id="{CF2A1630-D6BA-43E0-8E45-4E094A6624F7}" type="datetimeFigureOut">
               <a:rPr lang="en-GB" smtClean="0"/>
-              <a:t>06/11/2020</a:t>
+              <a:t>07/11/2020</a:t>
             </a:fld>
             <a:endParaRPr lang="en-GB"/>
           </a:p>
@@ -1838,7 +1838,7 @@
           <a:p>
             <a:fld id="{CF2A1630-D6BA-43E0-8E45-4E094A6624F7}" type="datetimeFigureOut">
               <a:rPr lang="en-GB" smtClean="0"/>
-              <a:t>06/11/2020</a:t>
+              <a:t>07/11/2020</a:t>
             </a:fld>
             <a:endParaRPr lang="en-GB"/>
           </a:p>
@@ -1980,7 +1980,7 @@
           <a:p>
             <a:fld id="{CF2A1630-D6BA-43E0-8E45-4E094A6624F7}" type="datetimeFigureOut">
               <a:rPr lang="en-GB" smtClean="0"/>
-              <a:t>06/11/2020</a:t>
+              <a:t>07/11/2020</a:t>
             </a:fld>
             <a:endParaRPr lang="en-GB"/>
           </a:p>
@@ -2093,7 +2093,7 @@
           <a:p>
             <a:fld id="{CF2A1630-D6BA-43E0-8E45-4E094A6624F7}" type="datetimeFigureOut">
               <a:rPr lang="en-GB" smtClean="0"/>
-              <a:t>06/11/2020</a:t>
+              <a:t>07/11/2020</a:t>
             </a:fld>
             <a:endParaRPr lang="en-GB"/>
           </a:p>
@@ -2406,7 +2406,7 @@
           <a:p>
             <a:fld id="{CF2A1630-D6BA-43E0-8E45-4E094A6624F7}" type="datetimeFigureOut">
               <a:rPr lang="en-GB" smtClean="0"/>
-              <a:t>06/11/2020</a:t>
+              <a:t>07/11/2020</a:t>
             </a:fld>
             <a:endParaRPr lang="en-GB"/>
           </a:p>
@@ -2695,7 +2695,7 @@
           <a:p>
             <a:fld id="{CF2A1630-D6BA-43E0-8E45-4E094A6624F7}" type="datetimeFigureOut">
               <a:rPr lang="en-GB" smtClean="0"/>
-              <a:t>06/11/2020</a:t>
+              <a:t>07/11/2020</a:t>
             </a:fld>
             <a:endParaRPr lang="en-GB"/>
           </a:p>
@@ -2938,7 +2938,7 @@
           <a:p>
             <a:fld id="{CF2A1630-D6BA-43E0-8E45-4E094A6624F7}" type="datetimeFigureOut">
               <a:rPr lang="en-GB" smtClean="0"/>
-              <a:t>06/11/2020</a:t>
+              <a:t>07/11/2020</a:t>
             </a:fld>
             <a:endParaRPr lang="en-GB"/>
           </a:p>
@@ -12759,8 +12759,8 @@
         </p:nvSpPr>
         <p:spPr>
           <a:xfrm>
-            <a:off x="536115" y="7093450"/>
-            <a:ext cx="1332000" cy="720000"/>
+            <a:off x="536115" y="7238907"/>
+            <a:ext cx="1352846" cy="568381"/>
           </a:xfrm>
           <a:prstGeom prst="rect">
             <a:avLst/>
@@ -12794,139 +12794,6 @@
           </a:p>
         </p:txBody>
       </p:sp>
-      <p:cxnSp>
-        <p:nvCxnSpPr>
-          <p:cNvPr id="26" name="Straight Connector 25">
-            <a:extLst>
-              <a:ext uri="{FF2B5EF4-FFF2-40B4-BE49-F238E27FC236}">
-                <a16:creationId xmlns:a16="http://schemas.microsoft.com/office/drawing/2014/main" id="{191E11CD-20E4-4DC7-817A-29D118A559A5}"/>
-              </a:ext>
-            </a:extLst>
-          </p:cNvPr>
-          <p:cNvCxnSpPr>
-            <a:cxnSpLocks/>
-            <a:stCxn id="25" idx="0"/>
-            <a:endCxn id="24" idx="2"/>
-          </p:cNvCxnSpPr>
-          <p:nvPr/>
-        </p:nvCxnSpPr>
-        <p:spPr>
-          <a:xfrm flipV="1">
-            <a:off x="1202115" y="6687670"/>
-            <a:ext cx="0" cy="405780"/>
-          </a:xfrm>
-          <a:prstGeom prst="line">
-            <a:avLst/>
-          </a:prstGeom>
-          <a:ln w="15875">
-            <a:headEnd type="none" w="lg" len="lg"/>
-          </a:ln>
-        </p:spPr>
-        <p:style>
-          <a:lnRef idx="2">
-            <a:schemeClr val="dk1"/>
-          </a:lnRef>
-          <a:fillRef idx="0">
-            <a:schemeClr val="dk1"/>
-          </a:fillRef>
-          <a:effectRef idx="1">
-            <a:schemeClr val="dk1"/>
-          </a:effectRef>
-          <a:fontRef idx="minor">
-            <a:schemeClr val="tx1"/>
-          </a:fontRef>
-        </p:style>
-      </p:cxnSp>
-      <p:sp>
-        <p:nvSpPr>
-          <p:cNvPr id="28" name="Diamond 27">
-            <a:extLst>
-              <a:ext uri="{FF2B5EF4-FFF2-40B4-BE49-F238E27FC236}">
-                <a16:creationId xmlns:a16="http://schemas.microsoft.com/office/drawing/2014/main" id="{55C46B60-45C9-4F00-B944-A7E521C69311}"/>
-              </a:ext>
-            </a:extLst>
-          </p:cNvPr>
-          <p:cNvSpPr/>
-          <p:nvPr/>
-        </p:nvSpPr>
-        <p:spPr>
-          <a:xfrm>
-            <a:off x="6832202" y="4949178"/>
-            <a:ext cx="2153417" cy="684738"/>
-          </a:xfrm>
-          <a:prstGeom prst="diamond">
-            <a:avLst/>
-          </a:prstGeom>
-        </p:spPr>
-        <p:style>
-          <a:lnRef idx="2">
-            <a:schemeClr val="dk1"/>
-          </a:lnRef>
-          <a:fillRef idx="1">
-            <a:schemeClr val="lt1"/>
-          </a:fillRef>
-          <a:effectRef idx="0">
-            <a:schemeClr val="dk1"/>
-          </a:effectRef>
-          <a:fontRef idx="minor">
-            <a:schemeClr val="dk1"/>
-          </a:fontRef>
-        </p:style>
-        <p:txBody>
-          <a:bodyPr rtlCol="0" anchor="ctr"/>
-          <a:lstStyle/>
-          <a:p>
-            <a:pPr algn="ctr"/>
-            <a:r>
-              <a:rPr lang="en-GB" dirty="0">
-                <a:latin typeface="Consolas" panose="020B0609020204030204" pitchFamily="49" charset="0"/>
-              </a:rPr>
-              <a:t>Has </a:t>
-            </a:r>
-          </a:p>
-        </p:txBody>
-      </p:sp>
-      <p:cxnSp>
-        <p:nvCxnSpPr>
-          <p:cNvPr id="53" name="Straight Connector 52">
-            <a:extLst>
-              <a:ext uri="{FF2B5EF4-FFF2-40B4-BE49-F238E27FC236}">
-                <a16:creationId xmlns:a16="http://schemas.microsoft.com/office/drawing/2014/main" id="{2CA410D5-56F8-432C-B70B-D6AE79927D60}"/>
-              </a:ext>
-            </a:extLst>
-          </p:cNvPr>
-          <p:cNvCxnSpPr>
-            <a:cxnSpLocks/>
-            <a:stCxn id="154" idx="0"/>
-            <a:endCxn id="19" idx="2"/>
-          </p:cNvCxnSpPr>
-          <p:nvPr/>
-        </p:nvCxnSpPr>
-        <p:spPr>
-          <a:xfrm flipH="1" flipV="1">
-            <a:off x="5078350" y="4104687"/>
-            <a:ext cx="8010" cy="522977"/>
-          </a:xfrm>
-          <a:prstGeom prst="line">
-            <a:avLst/>
-          </a:prstGeom>
-          <a:ln w="15875"/>
-        </p:spPr>
-        <p:style>
-          <a:lnRef idx="2">
-            <a:schemeClr val="dk1"/>
-          </a:lnRef>
-          <a:fillRef idx="0">
-            <a:schemeClr val="dk1"/>
-          </a:fillRef>
-          <a:effectRef idx="1">
-            <a:schemeClr val="dk1"/>
-          </a:effectRef>
-          <a:fontRef idx="minor">
-            <a:schemeClr val="tx1"/>
-          </a:fontRef>
-        </p:style>
-      </p:cxnSp>
       <p:sp>
         <p:nvSpPr>
           <p:cNvPr id="65" name="Oval 64">
@@ -13656,8 +13523,8 @@
         </p:nvSpPr>
         <p:spPr>
           <a:xfrm>
-            <a:off x="597750" y="8219230"/>
-            <a:ext cx="1260000" cy="540000"/>
+            <a:off x="639083" y="8358526"/>
+            <a:ext cx="1126063" cy="400704"/>
           </a:xfrm>
           <a:prstGeom prst="ellipse">
             <a:avLst/>
@@ -13707,9 +13574,9 @@
           <p:nvPr/>
         </p:nvCxnSpPr>
         <p:spPr>
-          <a:xfrm flipH="1" flipV="1">
-            <a:off x="1202115" y="7813450"/>
-            <a:ext cx="25635" cy="405780"/>
+          <a:xfrm flipV="1">
+            <a:off x="1202115" y="7807288"/>
+            <a:ext cx="10423" cy="551238"/>
           </a:xfrm>
           <a:prstGeom prst="line">
             <a:avLst/>
@@ -14231,15 +14098,15 @@
           </p:cNvPr>
           <p:cNvCxnSpPr>
             <a:cxnSpLocks/>
-            <a:stCxn id="28" idx="3"/>
+            <a:stCxn id="145" idx="3"/>
             <a:endCxn id="165" idx="0"/>
           </p:cNvCxnSpPr>
           <p:nvPr/>
         </p:nvCxnSpPr>
         <p:spPr>
           <a:xfrm>
-            <a:off x="8985619" y="5291547"/>
-            <a:ext cx="1943120" cy="738498"/>
+            <a:off x="9372966" y="5297603"/>
+            <a:ext cx="1555773" cy="732442"/>
           </a:xfrm>
           <a:prstGeom prst="line">
             <a:avLst/>
@@ -14676,10 +14543,9 @@
           <a:p>
             <a:pPr algn="ctr"/>
             <a:r>
-              <a:rPr lang="en-US" sz="1600" dirty="0" err="1"/>
+              <a:rPr lang="en-US" sz="1600" dirty="0"/>
               <a:t>bid_id</a:t>
             </a:r>
-            <a:endParaRPr lang="en-US" sz="1600" dirty="0"/>
           </a:p>
         </p:txBody>
       </p:sp>
@@ -16118,7 +15984,7 @@
         </p:nvSpPr>
         <p:spPr>
           <a:xfrm>
-            <a:off x="14983705" y="4714701"/>
+            <a:off x="15027997" y="4714701"/>
             <a:ext cx="3066977" cy="872503"/>
           </a:xfrm>
           <a:prstGeom prst="diamond">
@@ -16172,7 +16038,7 @@
         <p:spPr>
           <a:xfrm flipV="1">
             <a:off x="14107770" y="5150953"/>
-            <a:ext cx="875935" cy="8222"/>
+            <a:ext cx="920227" cy="8222"/>
           </a:xfrm>
           <a:prstGeom prst="line">
             <a:avLst/>
@@ -16208,7 +16074,7 @@
         </p:nvSpPr>
         <p:spPr>
           <a:xfrm>
-            <a:off x="15964731" y="5822259"/>
+            <a:off x="18680244" y="4872243"/>
             <a:ext cx="1104924" cy="540000"/>
           </a:xfrm>
           <a:prstGeom prst="ellipse">
@@ -16253,15 +16119,15 @@
           </p:cNvPr>
           <p:cNvCxnSpPr>
             <a:cxnSpLocks/>
-            <a:stCxn id="184" idx="2"/>
-            <a:endCxn id="389" idx="0"/>
+            <a:stCxn id="184" idx="3"/>
+            <a:endCxn id="389" idx="2"/>
           </p:cNvCxnSpPr>
           <p:nvPr/>
         </p:nvCxnSpPr>
         <p:spPr>
-          <a:xfrm flipH="1">
-            <a:off x="16517193" y="5587204"/>
-            <a:ext cx="1" cy="235055"/>
+          <a:xfrm flipV="1">
+            <a:off x="18094974" y="5142243"/>
+            <a:ext cx="585270" cy="8710"/>
           </a:xfrm>
           <a:prstGeom prst="line">
             <a:avLst/>
@@ -16299,7 +16165,7 @@
             </p:nvSpPr>
             <p:spPr>
               <a:xfrm>
-                <a:off x="15827052" y="2504150"/>
+                <a:off x="15827050" y="6348077"/>
                 <a:ext cx="1468869" cy="597677"/>
               </a:xfrm>
               <a:prstGeom prst="rect">
@@ -16365,7 +16231,7 @@
             </p:nvSpPr>
             <p:spPr>
               <a:xfrm>
-                <a:off x="15827052" y="2504150"/>
+                <a:off x="15827050" y="6348077"/>
                 <a:ext cx="1468869" cy="597677"/>
               </a:xfrm>
               <a:prstGeom prst="rect">
@@ -16407,7 +16273,7 @@
         </p:nvSpPr>
         <p:spPr>
           <a:xfrm>
-            <a:off x="15886013" y="1420040"/>
+            <a:off x="17910635" y="6378994"/>
             <a:ext cx="1322071" cy="566760"/>
           </a:xfrm>
           <a:prstGeom prst="ellipse">
@@ -16452,15 +16318,15 @@
           </p:cNvPr>
           <p:cNvCxnSpPr>
             <a:cxnSpLocks/>
-            <a:stCxn id="410" idx="0"/>
-            <a:endCxn id="411" idx="4"/>
+            <a:stCxn id="410" idx="3"/>
+            <a:endCxn id="411" idx="2"/>
           </p:cNvCxnSpPr>
           <p:nvPr/>
         </p:nvCxnSpPr>
         <p:spPr>
-          <a:xfrm flipH="1" flipV="1">
-            <a:off x="16547049" y="1986800"/>
-            <a:ext cx="14438" cy="517350"/>
+          <a:xfrm>
+            <a:off x="17295919" y="6646916"/>
+            <a:ext cx="614716" cy="15458"/>
           </a:xfrm>
           <a:prstGeom prst="line">
             <a:avLst/>
@@ -16493,15 +16359,15 @@
           </p:cNvPr>
           <p:cNvCxnSpPr>
             <a:cxnSpLocks/>
-            <a:stCxn id="184" idx="0"/>
-            <a:endCxn id="410" idx="2"/>
+            <a:stCxn id="184" idx="2"/>
+            <a:endCxn id="410" idx="0"/>
           </p:cNvCxnSpPr>
           <p:nvPr/>
         </p:nvCxnSpPr>
         <p:spPr>
-          <a:xfrm flipV="1">
-            <a:off x="16517194" y="3101827"/>
-            <a:ext cx="44293" cy="1612874"/>
+          <a:xfrm flipH="1">
+            <a:off x="16561485" y="5587204"/>
+            <a:ext cx="1" cy="760873"/>
           </a:xfrm>
           <a:prstGeom prst="line">
             <a:avLst/>
@@ -16613,95 +16479,6 @@
           </a:p>
         </p:txBody>
       </p:sp>
-      <p:sp>
-        <p:nvSpPr>
-          <p:cNvPr id="430" name="Oval 429">
-            <a:extLst>
-              <a:ext uri="{FF2B5EF4-FFF2-40B4-BE49-F238E27FC236}">
-                <a16:creationId xmlns:a16="http://schemas.microsoft.com/office/drawing/2014/main" id="{45C86430-D03A-45FE-8ED3-72AA1631018F}"/>
-              </a:ext>
-            </a:extLst>
-          </p:cNvPr>
-          <p:cNvSpPr/>
-          <p:nvPr/>
-        </p:nvSpPr>
-        <p:spPr>
-          <a:xfrm>
-            <a:off x="10850234" y="3224352"/>
-            <a:ext cx="1104924" cy="540000"/>
-          </a:xfrm>
-          <a:prstGeom prst="ellipse">
-            <a:avLst/>
-          </a:prstGeom>
-        </p:spPr>
-        <p:style>
-          <a:lnRef idx="2">
-            <a:schemeClr val="dk1"/>
-          </a:lnRef>
-          <a:fillRef idx="1">
-            <a:schemeClr val="lt1"/>
-          </a:fillRef>
-          <a:effectRef idx="0">
-            <a:schemeClr val="dk1"/>
-          </a:effectRef>
-          <a:fontRef idx="minor">
-            <a:schemeClr val="dk1"/>
-          </a:fontRef>
-        </p:style>
-        <p:txBody>
-          <a:bodyPr rtlCol="0" anchor="ctr"/>
-          <a:lstStyle/>
-          <a:p>
-            <a:pPr algn="ctr"/>
-            <a:r>
-              <a:rPr lang="en-US" sz="1600" dirty="0"/>
-              <a:t>price</a:t>
-            </a:r>
-            <a:endParaRPr lang="en-GB" sz="1600" dirty="0"/>
-          </a:p>
-        </p:txBody>
-      </p:sp>
-      <p:cxnSp>
-        <p:nvCxnSpPr>
-          <p:cNvPr id="431" name="Straight Connector 430">
-            <a:extLst>
-              <a:ext uri="{FF2B5EF4-FFF2-40B4-BE49-F238E27FC236}">
-                <a16:creationId xmlns:a16="http://schemas.microsoft.com/office/drawing/2014/main" id="{6AF5E245-D356-458F-A1CA-5D84B4CA492B}"/>
-              </a:ext>
-            </a:extLst>
-          </p:cNvPr>
-          <p:cNvCxnSpPr>
-            <a:cxnSpLocks/>
-            <a:stCxn id="429" idx="1"/>
-            <a:endCxn id="430" idx="7"/>
-          </p:cNvCxnSpPr>
-          <p:nvPr/>
-        </p:nvCxnSpPr>
-        <p:spPr>
-          <a:xfrm flipH="1">
-            <a:off x="11793346" y="2783543"/>
-            <a:ext cx="203229" cy="519890"/>
-          </a:xfrm>
-          <a:prstGeom prst="line">
-            <a:avLst/>
-          </a:prstGeom>
-          <a:ln w="15875"/>
-        </p:spPr>
-        <p:style>
-          <a:lnRef idx="2">
-            <a:schemeClr val="dk1"/>
-          </a:lnRef>
-          <a:fillRef idx="0">
-            <a:schemeClr val="dk1"/>
-          </a:fillRef>
-          <a:effectRef idx="1">
-            <a:schemeClr val="dk1"/>
-          </a:effectRef>
-          <a:fontRef idx="minor">
-            <a:schemeClr val="tx1"/>
-          </a:fontRef>
-        </p:style>
-      </p:cxnSp>
       <p:cxnSp>
         <p:nvCxnSpPr>
           <p:cNvPr id="435" name="Straight Connector 434">
@@ -16714,14 +16491,14 @@
           <p:cNvCxnSpPr>
             <a:cxnSpLocks/>
             <a:stCxn id="429" idx="3"/>
-            <a:endCxn id="410" idx="1"/>
+            <a:endCxn id="220" idx="1"/>
           </p:cNvCxnSpPr>
           <p:nvPr/>
         </p:nvCxnSpPr>
         <p:spPr>
           <a:xfrm>
             <a:off x="14896891" y="2783543"/>
-            <a:ext cx="930161" cy="19446"/>
+            <a:ext cx="444429" cy="7243"/>
           </a:xfrm>
           <a:prstGeom prst="line">
             <a:avLst/>
@@ -16795,7 +16572,7 @@
           </p:cNvPr>
           <p:cNvCxnSpPr>
             <a:cxnSpLocks/>
-            <a:stCxn id="28" idx="0"/>
+            <a:stCxn id="145" idx="0"/>
             <a:endCxn id="20" idx="2"/>
           </p:cNvCxnSpPr>
           <p:nvPr/>
@@ -16803,7 +16580,7 @@
         <p:spPr>
           <a:xfrm flipH="1" flipV="1">
             <a:off x="7183658" y="4120557"/>
-            <a:ext cx="725253" cy="828621"/>
+            <a:ext cx="1224768" cy="817046"/>
           </a:xfrm>
           <a:prstGeom prst="line">
             <a:avLst/>
@@ -17066,47 +16843,6 @@
           </a:fontRef>
         </p:style>
       </p:cxnSp>
-      <p:cxnSp>
-        <p:nvCxnSpPr>
-          <p:cNvPr id="162" name="Straight Connector 161">
-            <a:extLst>
-              <a:ext uri="{FF2B5EF4-FFF2-40B4-BE49-F238E27FC236}">
-                <a16:creationId xmlns:a16="http://schemas.microsoft.com/office/drawing/2014/main" id="{7EB5E82C-56E8-4B71-9473-01EF755F7BA1}"/>
-              </a:ext>
-            </a:extLst>
-          </p:cNvPr>
-          <p:cNvCxnSpPr>
-            <a:cxnSpLocks/>
-            <a:stCxn id="20" idx="0"/>
-            <a:endCxn id="130" idx="2"/>
-          </p:cNvCxnSpPr>
-          <p:nvPr/>
-        </p:nvCxnSpPr>
-        <p:spPr>
-          <a:xfrm flipH="1" flipV="1">
-            <a:off x="6858023" y="1412326"/>
-            <a:ext cx="325635" cy="2110554"/>
-          </a:xfrm>
-          <a:prstGeom prst="line">
-            <a:avLst/>
-          </a:prstGeom>
-          <a:ln w="15875"/>
-        </p:spPr>
-        <p:style>
-          <a:lnRef idx="2">
-            <a:schemeClr val="dk1"/>
-          </a:lnRef>
-          <a:fillRef idx="0">
-            <a:schemeClr val="dk1"/>
-          </a:fillRef>
-          <a:effectRef idx="1">
-            <a:schemeClr val="dk1"/>
-          </a:effectRef>
-          <a:fontRef idx="minor">
-            <a:schemeClr val="tx1"/>
-          </a:fontRef>
-        </p:style>
-      </p:cxnSp>
       <p:sp>
         <p:nvSpPr>
           <p:cNvPr id="166" name="Diamond 165">
@@ -17176,7 +16912,7 @@
         </p:nvSpPr>
         <p:spPr>
           <a:xfrm>
-            <a:off x="11180683" y="-308426"/>
+            <a:off x="14464189" y="783416"/>
             <a:ext cx="2097298" cy="676877"/>
           </a:xfrm>
           <a:prstGeom prst="rect">
@@ -17225,15 +16961,15 @@
           </p:cNvPr>
           <p:cNvCxnSpPr>
             <a:cxnSpLocks/>
-            <a:stCxn id="167" idx="2"/>
-            <a:endCxn id="166" idx="0"/>
+            <a:stCxn id="167" idx="1"/>
+            <a:endCxn id="166" idx="3"/>
           </p:cNvCxnSpPr>
           <p:nvPr/>
         </p:nvCxnSpPr>
         <p:spPr>
-          <a:xfrm>
-            <a:off x="12229332" y="368451"/>
-            <a:ext cx="11750" cy="311211"/>
+          <a:xfrm flipH="1">
+            <a:off x="14172944" y="1121855"/>
+            <a:ext cx="291245" cy="122"/>
           </a:xfrm>
           <a:prstGeom prst="line">
             <a:avLst/>
@@ -17271,7 +17007,7 @@
         </p:nvSpPr>
         <p:spPr>
           <a:xfrm>
-            <a:off x="11076433" y="-1214545"/>
+            <a:off x="17072673" y="851854"/>
             <a:ext cx="2293498" cy="540000"/>
           </a:xfrm>
           <a:prstGeom prst="ellipse">
@@ -17316,56 +17052,15 @@
           </p:cNvPr>
           <p:cNvCxnSpPr>
             <a:cxnSpLocks/>
-            <a:stCxn id="167" idx="0"/>
-            <a:endCxn id="169" idx="4"/>
+            <a:stCxn id="167" idx="3"/>
+            <a:endCxn id="169" idx="2"/>
           </p:cNvCxnSpPr>
           <p:nvPr/>
         </p:nvCxnSpPr>
         <p:spPr>
-          <a:xfrm flipH="1" flipV="1">
-            <a:off x="12223182" y="-674545"/>
-            <a:ext cx="6150" cy="366119"/>
-          </a:xfrm>
-          <a:prstGeom prst="line">
-            <a:avLst/>
-          </a:prstGeom>
-          <a:ln w="15875"/>
-        </p:spPr>
-        <p:style>
-          <a:lnRef idx="2">
-            <a:schemeClr val="dk1"/>
-          </a:lnRef>
-          <a:fillRef idx="0">
-            <a:schemeClr val="dk1"/>
-          </a:fillRef>
-          <a:effectRef idx="1">
-            <a:schemeClr val="dk1"/>
-          </a:effectRef>
-          <a:fontRef idx="minor">
-            <a:schemeClr val="tx1"/>
-          </a:fontRef>
-        </p:style>
-      </p:cxnSp>
-      <p:cxnSp>
-        <p:nvCxnSpPr>
-          <p:cNvPr id="171" name="Straight Connector 170">
-            <a:extLst>
-              <a:ext uri="{FF2B5EF4-FFF2-40B4-BE49-F238E27FC236}">
-                <a16:creationId xmlns:a16="http://schemas.microsoft.com/office/drawing/2014/main" id="{6D79B843-E793-4D3E-AA3F-63DBDE33DE55}"/>
-              </a:ext>
-            </a:extLst>
-          </p:cNvPr>
-          <p:cNvCxnSpPr>
-            <a:cxnSpLocks/>
-            <a:stCxn id="20" idx="0"/>
-            <a:endCxn id="166" idx="2"/>
-          </p:cNvCxnSpPr>
-          <p:nvPr/>
-        </p:nvCxnSpPr>
-        <p:spPr>
           <a:xfrm flipV="1">
-            <a:off x="7183658" y="1564291"/>
-            <a:ext cx="5057424" cy="1958589"/>
+            <a:off x="16561487" y="1121854"/>
+            <a:ext cx="511186" cy="1"/>
           </a:xfrm>
           <a:prstGeom prst="line">
             <a:avLst/>
@@ -17401,10 +17096,62 @@
         </p:nvSpPr>
         <p:spPr>
           <a:xfrm>
-            <a:off x="8198793" y="88643"/>
-            <a:ext cx="2218844" cy="847382"/>
+            <a:off x="8517923" y="-841081"/>
+            <a:ext cx="2104277" cy="765714"/>
           </a:xfrm>
           <a:prstGeom prst="diamond">
+            <a:avLst/>
+          </a:prstGeom>
+        </p:spPr>
+        <p:style>
+          <a:lnRef idx="2">
+            <a:schemeClr val="dk1"/>
+          </a:lnRef>
+          <a:fillRef idx="1">
+            <a:schemeClr val="lt1"/>
+          </a:fillRef>
+          <a:effectRef idx="0">
+            <a:schemeClr val="dk1"/>
+          </a:effectRef>
+          <a:fontRef idx="minor">
+            <a:schemeClr val="dk1"/>
+          </a:fontRef>
+        </p:style>
+        <p:txBody>
+          <a:bodyPr rtlCol="0" anchor="ctr"/>
+          <a:lstStyle/>
+          <a:p>
+            <a:pPr algn="ctr"/>
+            <a:r>
+              <a:rPr lang="en-GB" dirty="0" err="1">
+                <a:latin typeface="Consolas" panose="020B0609020204030204" pitchFamily="49" charset="0"/>
+              </a:rPr>
+              <a:t>SalaryEarned</a:t>
+            </a:r>
+            <a:endParaRPr lang="en-GB" dirty="0">
+              <a:latin typeface="Consolas" panose="020B0609020204030204" pitchFamily="49" charset="0"/>
+            </a:endParaRPr>
+          </a:p>
+        </p:txBody>
+      </p:sp>
+      <p:sp>
+        <p:nvSpPr>
+          <p:cNvPr id="178" name="Rectangle 177">
+            <a:extLst>
+              <a:ext uri="{FF2B5EF4-FFF2-40B4-BE49-F238E27FC236}">
+                <a16:creationId xmlns:a16="http://schemas.microsoft.com/office/drawing/2014/main" id="{2C49462D-36BA-42FC-8E05-B7B17333096E}"/>
+              </a:ext>
+            </a:extLst>
+          </p:cNvPr>
+          <p:cNvSpPr/>
+          <p:nvPr/>
+        </p:nvSpPr>
+        <p:spPr>
+          <a:xfrm>
+            <a:off x="8700261" y="-2243215"/>
+            <a:ext cx="1724932" cy="676877"/>
+          </a:xfrm>
+          <a:prstGeom prst="rect">
             <a:avLst/>
           </a:prstGeom>
         </p:spPr>
@@ -17431,56 +17178,7 @@
               <a:rPr lang="en-GB" dirty="0">
                 <a:latin typeface="Consolas" panose="020B0609020204030204" pitchFamily="49" charset="0"/>
               </a:rPr>
-              <a:t>Earns</a:t>
-            </a:r>
-          </a:p>
-        </p:txBody>
-      </p:sp>
-      <p:sp>
-        <p:nvSpPr>
-          <p:cNvPr id="178" name="Rectangle 177">
-            <a:extLst>
-              <a:ext uri="{FF2B5EF4-FFF2-40B4-BE49-F238E27FC236}">
-                <a16:creationId xmlns:a16="http://schemas.microsoft.com/office/drawing/2014/main" id="{2C49462D-36BA-42FC-8E05-B7B17333096E}"/>
-              </a:ext>
-            </a:extLst>
-          </p:cNvPr>
-          <p:cNvSpPr/>
-          <p:nvPr/>
-        </p:nvSpPr>
-        <p:spPr>
-          <a:xfrm>
-            <a:off x="8445749" y="-1028998"/>
-            <a:ext cx="1724932" cy="676877"/>
-          </a:xfrm>
-          <a:prstGeom prst="rect">
-            <a:avLst/>
-          </a:prstGeom>
-        </p:spPr>
-        <p:style>
-          <a:lnRef idx="2">
-            <a:schemeClr val="dk1"/>
-          </a:lnRef>
-          <a:fillRef idx="1">
-            <a:schemeClr val="lt1"/>
-          </a:fillRef>
-          <a:effectRef idx="0">
-            <a:schemeClr val="dk1"/>
-          </a:effectRef>
-          <a:fontRef idx="minor">
-            <a:schemeClr val="dk1"/>
-          </a:fontRef>
-        </p:style>
-        <p:txBody>
-          <a:bodyPr rtlCol="0" anchor="ctr"/>
-          <a:lstStyle/>
-          <a:p>
-            <a:pPr algn="ctr"/>
-            <a:r>
-              <a:rPr lang="en-GB" dirty="0">
-                <a:latin typeface="Consolas" panose="020B0609020204030204" pitchFamily="49" charset="0"/>
-              </a:rPr>
-              <a:t>Salary</a:t>
+              <a:t>Date</a:t>
             </a:r>
           </a:p>
         </p:txBody>
@@ -17503,8 +17201,8 @@
         </p:nvCxnSpPr>
         <p:spPr>
           <a:xfrm>
-            <a:off x="9308215" y="-352121"/>
-            <a:ext cx="0" cy="440764"/>
+            <a:off x="9562727" y="-1566338"/>
+            <a:ext cx="7335" cy="725257"/>
           </a:xfrm>
           <a:prstGeom prst="line">
             <a:avLst/>
@@ -17542,8 +17240,8 @@
         </p:nvSpPr>
         <p:spPr>
           <a:xfrm>
-            <a:off x="7133696" y="-2719550"/>
-            <a:ext cx="1173416" cy="443680"/>
+            <a:off x="6651388" y="-2661417"/>
+            <a:ext cx="1271777" cy="504226"/>
           </a:xfrm>
           <a:prstGeom prst="ellipse">
             <a:avLst/>
@@ -17587,15 +17285,15 @@
           </p:cNvPr>
           <p:cNvCxnSpPr>
             <a:cxnSpLocks/>
-            <a:stCxn id="178" idx="0"/>
-            <a:endCxn id="180" idx="4"/>
+            <a:stCxn id="178" idx="1"/>
+            <a:endCxn id="180" idx="5"/>
           </p:cNvCxnSpPr>
           <p:nvPr/>
         </p:nvCxnSpPr>
         <p:spPr>
           <a:xfrm flipH="1" flipV="1">
-            <a:off x="7720404" y="-2275870"/>
-            <a:ext cx="1587811" cy="1246872"/>
+            <a:off x="7736918" y="-2231033"/>
+            <a:ext cx="963343" cy="326257"/>
           </a:xfrm>
           <a:prstGeom prst="line">
             <a:avLst/>
@@ -17635,8 +17333,8 @@
         </p:nvCxnSpPr>
         <p:spPr>
           <a:xfrm flipV="1">
-            <a:off x="7183658" y="936025"/>
-            <a:ext cx="2124557" cy="2586855"/>
+            <a:off x="7183658" y="-75367"/>
+            <a:ext cx="2386404" cy="3598247"/>
           </a:xfrm>
           <a:prstGeom prst="line">
             <a:avLst/>
@@ -17669,15 +17367,15 @@
           </p:cNvPr>
           <p:cNvCxnSpPr>
             <a:cxnSpLocks/>
-            <a:stCxn id="178" idx="0"/>
-            <a:endCxn id="197" idx="5"/>
+            <a:stCxn id="178" idx="1"/>
+            <a:endCxn id="197" idx="6"/>
           </p:cNvCxnSpPr>
           <p:nvPr/>
         </p:nvCxnSpPr>
         <p:spPr>
           <a:xfrm flipH="1" flipV="1">
-            <a:off x="7174642" y="-1890737"/>
-            <a:ext cx="2133573" cy="861739"/>
+            <a:off x="6885913" y="-2023523"/>
+            <a:ext cx="1814348" cy="118747"/>
           </a:xfrm>
           <a:prstGeom prst="line">
             <a:avLst/>
@@ -17711,14 +17409,14 @@
           <p:cNvCxnSpPr>
             <a:cxnSpLocks/>
             <a:stCxn id="198" idx="4"/>
-            <a:endCxn id="178" idx="0"/>
+            <a:endCxn id="174" idx="3"/>
           </p:cNvCxnSpPr>
           <p:nvPr/>
         </p:nvCxnSpPr>
         <p:spPr>
-          <a:xfrm>
-            <a:off x="9262104" y="-2343914"/>
-            <a:ext cx="46111" cy="1314916"/>
+          <a:xfrm flipH="1">
+            <a:off x="10622200" y="-1251660"/>
+            <a:ext cx="1191729" cy="793436"/>
           </a:xfrm>
           <a:prstGeom prst="line">
             <a:avLst/>
@@ -17754,7 +17452,7 @@
         </p:nvSpPr>
         <p:spPr>
           <a:xfrm>
-            <a:off x="6046385" y="-2351656"/>
+            <a:off x="5564078" y="-2293523"/>
             <a:ext cx="1321835" cy="540000"/>
           </a:xfrm>
           <a:prstGeom prst="ellipse">
@@ -17781,10 +17479,9 @@
           <a:p>
             <a:pPr algn="ctr"/>
             <a:r>
-              <a:rPr lang="en-GB" sz="1600" u="sng" dirty="0" err="1"/>
-              <a:t>montth</a:t>
+              <a:rPr lang="en-GB" sz="1600" u="sng" dirty="0"/>
+              <a:t>month</a:t>
             </a:r>
-            <a:endParaRPr lang="en-GB" sz="1600" u="sng" dirty="0"/>
           </a:p>
         </p:txBody>
       </p:sp>
@@ -17802,7 +17499,7 @@
         </p:nvSpPr>
         <p:spPr>
           <a:xfrm>
-            <a:off x="8463614" y="-2883914"/>
+            <a:off x="11015439" y="-1791660"/>
             <a:ext cx="1596979" cy="540000"/>
           </a:xfrm>
           <a:prstGeom prst="ellipse">
@@ -17847,15 +17544,15 @@
           </p:cNvPr>
           <p:cNvCxnSpPr>
             <a:cxnSpLocks/>
-            <a:stCxn id="178" idx="0"/>
-            <a:endCxn id="202" idx="3"/>
+            <a:stCxn id="174" idx="3"/>
+            <a:endCxn id="202" idx="2"/>
           </p:cNvCxnSpPr>
           <p:nvPr/>
         </p:nvCxnSpPr>
         <p:spPr>
           <a:xfrm flipV="1">
-            <a:off x="9308215" y="-1833480"/>
-            <a:ext cx="2267465" cy="804482"/>
+            <a:off x="10622200" y="-700907"/>
+            <a:ext cx="2409757" cy="242683"/>
           </a:xfrm>
           <a:prstGeom prst="line">
             <a:avLst/>
@@ -17891,7 +17588,7 @@
         </p:nvSpPr>
         <p:spPr>
           <a:xfrm>
-            <a:off x="10144036" y="-2877207"/>
+            <a:off x="12628321" y="-1611300"/>
             <a:ext cx="1636824" cy="540000"/>
           </a:xfrm>
           <a:prstGeom prst="ellipse">
@@ -17936,15 +17633,15 @@
           </p:cNvPr>
           <p:cNvCxnSpPr>
             <a:cxnSpLocks/>
-            <a:stCxn id="200" idx="4"/>
-            <a:endCxn id="178" idx="0"/>
+            <a:stCxn id="200" idx="3"/>
+            <a:endCxn id="174" idx="3"/>
           </p:cNvCxnSpPr>
           <p:nvPr/>
         </p:nvCxnSpPr>
         <p:spPr>
           <a:xfrm flipH="1">
-            <a:off x="9308215" y="-2337207"/>
-            <a:ext cx="1654233" cy="1308209"/>
+            <a:off x="10622200" y="-1150381"/>
+            <a:ext cx="2245828" cy="692157"/>
           </a:xfrm>
           <a:prstGeom prst="line">
             <a:avLst/>
@@ -17980,7 +17677,7 @@
         </p:nvSpPr>
         <p:spPr>
           <a:xfrm>
-            <a:off x="11382102" y="-2294399"/>
+            <a:off x="13031957" y="-970907"/>
             <a:ext cx="1321835" cy="540000"/>
           </a:xfrm>
           <a:prstGeom prst="ellipse">
@@ -18013,6 +17710,458 @@
           </a:p>
         </p:txBody>
       </p:sp>
+      <p:cxnSp>
+        <p:nvCxnSpPr>
+          <p:cNvPr id="186" name="Straight Connector 185">
+            <a:extLst>
+              <a:ext uri="{FF2B5EF4-FFF2-40B4-BE49-F238E27FC236}">
+                <a16:creationId xmlns:a16="http://schemas.microsoft.com/office/drawing/2014/main" id="{21462856-712E-4842-95A9-F0DEE353B6A5}"/>
+              </a:ext>
+            </a:extLst>
+          </p:cNvPr>
+          <p:cNvCxnSpPr>
+            <a:cxnSpLocks/>
+            <a:stCxn id="130" idx="2"/>
+            <a:endCxn id="20" idx="0"/>
+          </p:cNvCxnSpPr>
+          <p:nvPr/>
+        </p:nvCxnSpPr>
+        <p:spPr>
+          <a:xfrm>
+            <a:off x="6858023" y="1412326"/>
+            <a:ext cx="325635" cy="2110554"/>
+          </a:xfrm>
+          <a:prstGeom prst="line">
+            <a:avLst/>
+          </a:prstGeom>
+          <a:ln w="76200" cmpd="dbl">
+            <a:headEnd type="stealth" w="sm" len="sm"/>
+          </a:ln>
+        </p:spPr>
+        <p:style>
+          <a:lnRef idx="2">
+            <a:schemeClr val="dk1"/>
+          </a:lnRef>
+          <a:fillRef idx="0">
+            <a:schemeClr val="dk1"/>
+          </a:fillRef>
+          <a:effectRef idx="1">
+            <a:schemeClr val="dk1"/>
+          </a:effectRef>
+          <a:fontRef idx="minor">
+            <a:schemeClr val="tx1"/>
+          </a:fontRef>
+        </p:style>
+      </p:cxnSp>
+      <p:cxnSp>
+        <p:nvCxnSpPr>
+          <p:cNvPr id="187" name="Straight Connector 186">
+            <a:extLst>
+              <a:ext uri="{FF2B5EF4-FFF2-40B4-BE49-F238E27FC236}">
+                <a16:creationId xmlns:a16="http://schemas.microsoft.com/office/drawing/2014/main" id="{DCBAA4CB-976D-49CC-BC68-C6BF9E03C690}"/>
+              </a:ext>
+            </a:extLst>
+          </p:cNvPr>
+          <p:cNvCxnSpPr>
+            <a:cxnSpLocks/>
+            <a:stCxn id="166" idx="1"/>
+            <a:endCxn id="20" idx="0"/>
+          </p:cNvCxnSpPr>
+          <p:nvPr/>
+        </p:nvCxnSpPr>
+        <p:spPr>
+          <a:xfrm flipH="1">
+            <a:off x="7183658" y="1121977"/>
+            <a:ext cx="3125562" cy="2400903"/>
+          </a:xfrm>
+          <a:prstGeom prst="line">
+            <a:avLst/>
+          </a:prstGeom>
+          <a:ln w="76200" cmpd="dbl">
+            <a:headEnd type="stealth" w="sm" len="sm"/>
+          </a:ln>
+        </p:spPr>
+        <p:style>
+          <a:lnRef idx="2">
+            <a:schemeClr val="dk1"/>
+          </a:lnRef>
+          <a:fillRef idx="0">
+            <a:schemeClr val="dk1"/>
+          </a:fillRef>
+          <a:effectRef idx="1">
+            <a:schemeClr val="dk1"/>
+          </a:effectRef>
+          <a:fontRef idx="minor">
+            <a:schemeClr val="tx1"/>
+          </a:fontRef>
+        </p:style>
+      </p:cxnSp>
+      <p:sp>
+        <p:nvSpPr>
+          <p:cNvPr id="220" name="Rectangle 219">
+            <a:extLst>
+              <a:ext uri="{FF2B5EF4-FFF2-40B4-BE49-F238E27FC236}">
+                <a16:creationId xmlns:a16="http://schemas.microsoft.com/office/drawing/2014/main" id="{F60280CA-EF14-4D83-8875-1447DC1FF571}"/>
+              </a:ext>
+            </a:extLst>
+          </p:cNvPr>
+          <p:cNvSpPr/>
+          <p:nvPr/>
+        </p:nvSpPr>
+        <p:spPr>
+          <a:xfrm>
+            <a:off x="15341320" y="2464933"/>
+            <a:ext cx="1764768" cy="651706"/>
+          </a:xfrm>
+          <a:prstGeom prst="rect">
+            <a:avLst/>
+          </a:prstGeom>
+        </p:spPr>
+        <p:style>
+          <a:lnRef idx="2">
+            <a:schemeClr val="dk1"/>
+          </a:lnRef>
+          <a:fillRef idx="1">
+            <a:schemeClr val="lt1"/>
+          </a:fillRef>
+          <a:effectRef idx="0">
+            <a:schemeClr val="dk1"/>
+          </a:effectRef>
+          <a:fontRef idx="minor">
+            <a:schemeClr val="dk1"/>
+          </a:fontRef>
+        </p:style>
+        <p:txBody>
+          <a:bodyPr rtlCol="0" anchor="ctr"/>
+          <a:lstStyle/>
+          <a:p>
+            <a:pPr algn="ctr"/>
+            <a:r>
+              <a:rPr lang="en-GB" dirty="0" err="1">
+                <a:latin typeface="Consolas" panose="020B0609020204030204" pitchFamily="49" charset="0"/>
+              </a:rPr>
+              <a:t>DefaultPriceList</a:t>
+            </a:r>
+            <a:endParaRPr lang="en-GB" dirty="0">
+              <a:latin typeface="Consolas" panose="020B0609020204030204" pitchFamily="49" charset="0"/>
+            </a:endParaRPr>
+          </a:p>
+        </p:txBody>
+      </p:sp>
+      <p:sp>
+        <p:nvSpPr>
+          <p:cNvPr id="221" name="Oval 220">
+            <a:extLst>
+              <a:ext uri="{FF2B5EF4-FFF2-40B4-BE49-F238E27FC236}">
+                <a16:creationId xmlns:a16="http://schemas.microsoft.com/office/drawing/2014/main" id="{83BBD579-C612-4524-947A-1A8195770441}"/>
+              </a:ext>
+            </a:extLst>
+          </p:cNvPr>
+          <p:cNvSpPr/>
+          <p:nvPr/>
+        </p:nvSpPr>
+        <p:spPr>
+          <a:xfrm>
+            <a:off x="17739580" y="2493722"/>
+            <a:ext cx="1322071" cy="566760"/>
+          </a:xfrm>
+          <a:prstGeom prst="ellipse">
+            <a:avLst/>
+          </a:prstGeom>
+        </p:spPr>
+        <p:style>
+          <a:lnRef idx="2">
+            <a:schemeClr val="dk1"/>
+          </a:lnRef>
+          <a:fillRef idx="1">
+            <a:schemeClr val="lt1"/>
+          </a:fillRef>
+          <a:effectRef idx="0">
+            <a:schemeClr val="dk1"/>
+          </a:effectRef>
+          <a:fontRef idx="minor">
+            <a:schemeClr val="dk1"/>
+          </a:fontRef>
+        </p:style>
+        <p:txBody>
+          <a:bodyPr rtlCol="0" anchor="ctr"/>
+          <a:lstStyle/>
+          <a:p>
+            <a:pPr algn="ctr"/>
+            <a:r>
+              <a:rPr lang="en-US" sz="1600" u="sng" dirty="0" err="1"/>
+              <a:t>pettype</a:t>
+            </a:r>
+            <a:endParaRPr lang="en-GB" sz="1600" u="sng" dirty="0"/>
+          </a:p>
+        </p:txBody>
+      </p:sp>
+      <p:cxnSp>
+        <p:nvCxnSpPr>
+          <p:cNvPr id="222" name="Straight Connector 221">
+            <a:extLst>
+              <a:ext uri="{FF2B5EF4-FFF2-40B4-BE49-F238E27FC236}">
+                <a16:creationId xmlns:a16="http://schemas.microsoft.com/office/drawing/2014/main" id="{ED1850B4-8BF3-479C-A3EF-97AC5DBD84EE}"/>
+              </a:ext>
+            </a:extLst>
+          </p:cNvPr>
+          <p:cNvCxnSpPr>
+            <a:cxnSpLocks/>
+            <a:stCxn id="220" idx="3"/>
+            <a:endCxn id="221" idx="2"/>
+          </p:cNvCxnSpPr>
+          <p:nvPr/>
+        </p:nvCxnSpPr>
+        <p:spPr>
+          <a:xfrm flipV="1">
+            <a:off x="17106088" y="2777102"/>
+            <a:ext cx="633492" cy="13684"/>
+          </a:xfrm>
+          <a:prstGeom prst="line">
+            <a:avLst/>
+          </a:prstGeom>
+          <a:ln w="15875"/>
+        </p:spPr>
+        <p:style>
+          <a:lnRef idx="2">
+            <a:schemeClr val="dk1"/>
+          </a:lnRef>
+          <a:fillRef idx="0">
+            <a:schemeClr val="dk1"/>
+          </a:fillRef>
+          <a:effectRef idx="1">
+            <a:schemeClr val="dk1"/>
+          </a:effectRef>
+          <a:fontRef idx="minor">
+            <a:schemeClr val="tx1"/>
+          </a:fontRef>
+        </p:style>
+      </p:cxnSp>
+      <p:sp>
+        <p:nvSpPr>
+          <p:cNvPr id="233" name="Oval 232">
+            <a:extLst>
+              <a:ext uri="{FF2B5EF4-FFF2-40B4-BE49-F238E27FC236}">
+                <a16:creationId xmlns:a16="http://schemas.microsoft.com/office/drawing/2014/main" id="{532285CE-37F5-4F3C-AF4E-21B9F9A9D5F3}"/>
+              </a:ext>
+            </a:extLst>
+          </p:cNvPr>
+          <p:cNvSpPr/>
+          <p:nvPr/>
+        </p:nvSpPr>
+        <p:spPr>
+          <a:xfrm>
+            <a:off x="17739580" y="3252880"/>
+            <a:ext cx="1104924" cy="540000"/>
+          </a:xfrm>
+          <a:prstGeom prst="ellipse">
+            <a:avLst/>
+          </a:prstGeom>
+        </p:spPr>
+        <p:style>
+          <a:lnRef idx="2">
+            <a:schemeClr val="dk1"/>
+          </a:lnRef>
+          <a:fillRef idx="1">
+            <a:schemeClr val="lt1"/>
+          </a:fillRef>
+          <a:effectRef idx="0">
+            <a:schemeClr val="dk1"/>
+          </a:effectRef>
+          <a:fontRef idx="minor">
+            <a:schemeClr val="dk1"/>
+          </a:fontRef>
+        </p:style>
+        <p:txBody>
+          <a:bodyPr rtlCol="0" anchor="ctr"/>
+          <a:lstStyle/>
+          <a:p>
+            <a:pPr algn="ctr"/>
+            <a:r>
+              <a:rPr lang="en-US" sz="1600" dirty="0"/>
+              <a:t>price</a:t>
+            </a:r>
+            <a:endParaRPr lang="en-GB" sz="1600" dirty="0"/>
+          </a:p>
+        </p:txBody>
+      </p:sp>
+      <p:cxnSp>
+        <p:nvCxnSpPr>
+          <p:cNvPr id="234" name="Straight Connector 233">
+            <a:extLst>
+              <a:ext uri="{FF2B5EF4-FFF2-40B4-BE49-F238E27FC236}">
+                <a16:creationId xmlns:a16="http://schemas.microsoft.com/office/drawing/2014/main" id="{8FAAAB97-BACC-4FFF-A8F5-734432E8997A}"/>
+              </a:ext>
+            </a:extLst>
+          </p:cNvPr>
+          <p:cNvCxnSpPr>
+            <a:cxnSpLocks/>
+            <a:stCxn id="220" idx="3"/>
+            <a:endCxn id="233" idx="1"/>
+          </p:cNvCxnSpPr>
+          <p:nvPr/>
+        </p:nvCxnSpPr>
+        <p:spPr>
+          <a:xfrm>
+            <a:off x="17106088" y="2790786"/>
+            <a:ext cx="795304" cy="541175"/>
+          </a:xfrm>
+          <a:prstGeom prst="line">
+            <a:avLst/>
+          </a:prstGeom>
+          <a:ln w="15875"/>
+        </p:spPr>
+        <p:style>
+          <a:lnRef idx="2">
+            <a:schemeClr val="dk1"/>
+          </a:lnRef>
+          <a:fillRef idx="0">
+            <a:schemeClr val="dk1"/>
+          </a:fillRef>
+          <a:effectRef idx="1">
+            <a:schemeClr val="dk1"/>
+          </a:effectRef>
+          <a:fontRef idx="minor">
+            <a:schemeClr val="tx1"/>
+          </a:fontRef>
+        </p:style>
+      </p:cxnSp>
+      <p:sp>
+        <p:nvSpPr>
+          <p:cNvPr id="145" name="Diamond 144">
+            <a:extLst>
+              <a:ext uri="{FF2B5EF4-FFF2-40B4-BE49-F238E27FC236}">
+                <a16:creationId xmlns:a16="http://schemas.microsoft.com/office/drawing/2014/main" id="{BC96A160-A829-4D66-97FD-0B2FD64A763F}"/>
+              </a:ext>
+            </a:extLst>
+          </p:cNvPr>
+          <p:cNvSpPr/>
+          <p:nvPr/>
+        </p:nvSpPr>
+        <p:spPr>
+          <a:xfrm>
+            <a:off x="7443886" y="4937603"/>
+            <a:ext cx="1929080" cy="720000"/>
+          </a:xfrm>
+          <a:prstGeom prst="diamond">
+            <a:avLst/>
+          </a:prstGeom>
+          <a:ln w="76200" cmpd="dbl"/>
+        </p:spPr>
+        <p:style>
+          <a:lnRef idx="2">
+            <a:schemeClr val="dk1"/>
+          </a:lnRef>
+          <a:fillRef idx="1">
+            <a:schemeClr val="lt1"/>
+          </a:fillRef>
+          <a:effectRef idx="0">
+            <a:schemeClr val="dk1"/>
+          </a:effectRef>
+          <a:fontRef idx="minor">
+            <a:schemeClr val="dk1"/>
+          </a:fontRef>
+        </p:style>
+        <p:txBody>
+          <a:bodyPr rtlCol="0" anchor="ctr"/>
+          <a:lstStyle/>
+          <a:p>
+            <a:pPr algn="ctr"/>
+            <a:r>
+              <a:rPr lang="en-GB" dirty="0">
+                <a:latin typeface="Consolas" panose="020B0609020204030204" pitchFamily="49" charset="0"/>
+              </a:rPr>
+              <a:t>Has</a:t>
+            </a:r>
+          </a:p>
+        </p:txBody>
+      </p:sp>
+      <p:cxnSp>
+        <p:nvCxnSpPr>
+          <p:cNvPr id="246" name="Straight Connector 245">
+            <a:extLst>
+              <a:ext uri="{FF2B5EF4-FFF2-40B4-BE49-F238E27FC236}">
+                <a16:creationId xmlns:a16="http://schemas.microsoft.com/office/drawing/2014/main" id="{DBA229E7-612E-455B-A1A9-3668BFFCBD73}"/>
+              </a:ext>
+            </a:extLst>
+          </p:cNvPr>
+          <p:cNvCxnSpPr>
+            <a:cxnSpLocks/>
+            <a:stCxn id="154" idx="0"/>
+            <a:endCxn id="19" idx="2"/>
+          </p:cNvCxnSpPr>
+          <p:nvPr/>
+        </p:nvCxnSpPr>
+        <p:spPr>
+          <a:xfrm flipH="1" flipV="1">
+            <a:off x="5078350" y="4104687"/>
+            <a:ext cx="8010" cy="522977"/>
+          </a:xfrm>
+          <a:prstGeom prst="line">
+            <a:avLst/>
+          </a:prstGeom>
+          <a:ln w="76200" cmpd="dbl">
+            <a:headEnd type="none" w="sm" len="sm"/>
+          </a:ln>
+        </p:spPr>
+        <p:style>
+          <a:lnRef idx="2">
+            <a:schemeClr val="dk1"/>
+          </a:lnRef>
+          <a:fillRef idx="0">
+            <a:schemeClr val="dk1"/>
+          </a:fillRef>
+          <a:effectRef idx="1">
+            <a:schemeClr val="dk1"/>
+          </a:effectRef>
+          <a:fontRef idx="minor">
+            <a:schemeClr val="tx1"/>
+          </a:fontRef>
+        </p:style>
+      </p:cxnSp>
+      <p:cxnSp>
+        <p:nvCxnSpPr>
+          <p:cNvPr id="257" name="Straight Connector 256">
+            <a:extLst>
+              <a:ext uri="{FF2B5EF4-FFF2-40B4-BE49-F238E27FC236}">
+                <a16:creationId xmlns:a16="http://schemas.microsoft.com/office/drawing/2014/main" id="{6F48CBCE-BEBD-4072-A90C-F152C315F300}"/>
+              </a:ext>
+            </a:extLst>
+          </p:cNvPr>
+          <p:cNvCxnSpPr>
+            <a:cxnSpLocks/>
+            <a:stCxn id="25" idx="0"/>
+            <a:endCxn id="24" idx="2"/>
+          </p:cNvCxnSpPr>
+          <p:nvPr/>
+        </p:nvCxnSpPr>
+        <p:spPr>
+          <a:xfrm flipH="1" flipV="1">
+            <a:off x="1202115" y="6687670"/>
+            <a:ext cx="10423" cy="551237"/>
+          </a:xfrm>
+          <a:prstGeom prst="line">
+            <a:avLst/>
+          </a:prstGeom>
+          <a:ln w="76200" cmpd="dbl">
+            <a:headEnd type="none" w="sm" len="sm"/>
+          </a:ln>
+        </p:spPr>
+        <p:style>
+          <a:lnRef idx="2">
+            <a:schemeClr val="dk1"/>
+          </a:lnRef>
+          <a:fillRef idx="0">
+            <a:schemeClr val="dk1"/>
+          </a:fillRef>
+          <a:effectRef idx="1">
+            <a:schemeClr val="dk1"/>
+          </a:effectRef>
+          <a:fontRef idx="minor">
+            <a:schemeClr val="tx1"/>
+          </a:fontRef>
+        </p:style>
+      </p:cxnSp>
     </p:spTree>
     <p:extLst>
       <p:ext uri="{BB962C8B-B14F-4D97-AF65-F5344CB8AC3E}">
@@ -18322,6 +18471,21 @@
 </file>
 
 <file path=customXml/item1.xml><?xml version="1.0" encoding="utf-8"?>
+<p:properties xmlns:p="http://schemas.microsoft.com/office/2006/metadata/properties" xmlns:xsi="http://www.w3.org/2001/XMLSchema-instance" xmlns:pc="http://schemas.microsoft.com/office/infopath/2007/PartnerControls">
+  <documentManagement/>
+</p:properties>
+</file>
+
+<file path=customXml/item2.xml><?xml version="1.0" encoding="utf-8"?>
+<?mso-contentType ?>
+<FormTemplates xmlns="http://schemas.microsoft.com/sharepoint/v3/contenttype/forms">
+  <Display>DocumentLibraryForm</Display>
+  <Edit>DocumentLibraryForm</Edit>
+  <New>DocumentLibraryForm</New>
+</FormTemplates>
+</file>
+
+<file path=customXml/item3.xml><?xml version="1.0" encoding="utf-8"?>
 <ct:contentTypeSchema xmlns:ct="http://schemas.microsoft.com/office/2006/metadata/contentType" xmlns:ma="http://schemas.microsoft.com/office/2006/metadata/properties/metaAttributes" ct:_="" ma:_="" ma:contentTypeName="Document" ma:contentTypeID="0x01010006B00701839A694C99426BB45CC69360" ma:contentTypeVersion="9" ma:contentTypeDescription="Create a new document." ma:contentTypeScope="" ma:versionID="e344256978f14a8757a85bed12502daf">
   <xsd:schema xmlns:xsd="http://www.w3.org/2001/XMLSchema" xmlns:xs="http://www.w3.org/2001/XMLSchema" xmlns:p="http://schemas.microsoft.com/office/2006/metadata/properties" xmlns:ns3="b60769e2-796d-4bcb-9a3b-3cbc09cb3c87" targetNamespace="http://schemas.microsoft.com/office/2006/metadata/properties" ma:root="true" ma:fieldsID="62060ec61ee8572ba1899297ee50551f" ns3:_="">
     <xsd:import namespace="b60769e2-796d-4bcb-9a3b-3cbc09cb3c87"/>
@@ -18499,22 +18663,31 @@
 </ct:contentTypeSchema>
 </file>
 
-<file path=customXml/item2.xml><?xml version="1.0" encoding="utf-8"?>
-<?mso-contentType ?>
-<FormTemplates xmlns="http://schemas.microsoft.com/sharepoint/v3/contenttype/forms">
-  <Display>DocumentLibraryForm</Display>
-  <Edit>DocumentLibraryForm</Edit>
-  <New>DocumentLibraryForm</New>
-</FormTemplates>
+<file path=customXml/itemProps1.xml><?xml version="1.0" encoding="utf-8"?>
+<ds:datastoreItem xmlns:ds="http://schemas.openxmlformats.org/officeDocument/2006/customXml" ds:itemID="{17AC53AC-F2A9-4103-B84D-A7C0F1E6D282}">
+  <ds:schemaRefs>
+    <ds:schemaRef ds:uri="http://purl.org/dc/terms/"/>
+    <ds:schemaRef ds:uri="b60769e2-796d-4bcb-9a3b-3cbc09cb3c87"/>
+    <ds:schemaRef ds:uri="http://purl.org/dc/dcmitype/"/>
+    <ds:schemaRef ds:uri="http://schemas.microsoft.com/office/infopath/2007/PartnerControls"/>
+    <ds:schemaRef ds:uri="http://purl.org/dc/elements/1.1/"/>
+    <ds:schemaRef ds:uri="http://schemas.microsoft.com/office/2006/documentManagement/types"/>
+    <ds:schemaRef ds:uri="http://schemas.openxmlformats.org/package/2006/metadata/core-properties"/>
+    <ds:schemaRef ds:uri="http://schemas.microsoft.com/office/2006/metadata/properties"/>
+    <ds:schemaRef ds:uri="http://www.w3.org/XML/1998/namespace"/>
+  </ds:schemaRefs>
+</ds:datastoreItem>
 </file>
 
-<file path=customXml/item3.xml><?xml version="1.0" encoding="utf-8"?>
-<p:properties xmlns:p="http://schemas.microsoft.com/office/2006/metadata/properties" xmlns:xsi="http://www.w3.org/2001/XMLSchema-instance" xmlns:pc="http://schemas.microsoft.com/office/infopath/2007/PartnerControls">
-  <documentManagement/>
-</p:properties>
+<file path=customXml/itemProps2.xml><?xml version="1.0" encoding="utf-8"?>
+<ds:datastoreItem xmlns:ds="http://schemas.openxmlformats.org/officeDocument/2006/customXml" ds:itemID="{9DEC84EE-1729-403C-81F8-386101000A3E}">
+  <ds:schemaRefs>
+    <ds:schemaRef ds:uri="http://schemas.microsoft.com/sharepoint/v3/contenttype/forms"/>
+  </ds:schemaRefs>
+</ds:datastoreItem>
 </file>
 
-<file path=customXml/itemProps1.xml><?xml version="1.0" encoding="utf-8"?>
+<file path=customXml/itemProps3.xml><?xml version="1.0" encoding="utf-8"?>
 <ds:datastoreItem xmlns:ds="http://schemas.openxmlformats.org/officeDocument/2006/customXml" ds:itemID="{54E35DC9-7376-408F-80E6-31E962DA5B88}">
   <ds:schemaRefs>
     <ds:schemaRef ds:uri="http://schemas.microsoft.com/office/2006/metadata/contentType"/>
@@ -18530,28 +18703,4 @@
     <ds:schemaRef ds:uri="http://schemas.microsoft.com/internal/obd"/>
   </ds:schemaRefs>
 </ds:datastoreItem>
-</file>
-
-<file path=customXml/itemProps2.xml><?xml version="1.0" encoding="utf-8"?>
-<ds:datastoreItem xmlns:ds="http://schemas.openxmlformats.org/officeDocument/2006/customXml" ds:itemID="{9DEC84EE-1729-403C-81F8-386101000A3E}">
-  <ds:schemaRefs>
-    <ds:schemaRef ds:uri="http://schemas.microsoft.com/sharepoint/v3/contenttype/forms"/>
-  </ds:schemaRefs>
-</ds:datastoreItem>
-</file>
-
-<file path=customXml/itemProps3.xml><?xml version="1.0" encoding="utf-8"?>
-<ds:datastoreItem xmlns:ds="http://schemas.openxmlformats.org/officeDocument/2006/customXml" ds:itemID="{17AC53AC-F2A9-4103-B84D-A7C0F1E6D282}">
-  <ds:schemaRefs>
-    <ds:schemaRef ds:uri="http://purl.org/dc/terms/"/>
-    <ds:schemaRef ds:uri="b60769e2-796d-4bcb-9a3b-3cbc09cb3c87"/>
-    <ds:schemaRef ds:uri="http://purl.org/dc/dcmitype/"/>
-    <ds:schemaRef ds:uri="http://schemas.microsoft.com/office/infopath/2007/PartnerControls"/>
-    <ds:schemaRef ds:uri="http://purl.org/dc/elements/1.1/"/>
-    <ds:schemaRef ds:uri="http://schemas.microsoft.com/office/2006/documentManagement/types"/>
-    <ds:schemaRef ds:uri="http://schemas.openxmlformats.org/package/2006/metadata/core-properties"/>
-    <ds:schemaRef ds:uri="http://schemas.microsoft.com/office/2006/metadata/properties"/>
-    <ds:schemaRef ds:uri="http://www.w3.org/XML/1998/namespace"/>
-  </ds:schemaRefs>
-</ds:datastoreItem>
 </file>
</xml_diff>